<commit_message>
Added toggle for changing between projected and unprojected (lon/lat) values in coordinate fields. Added a test plan document. Commented out Pluto downloads in get_kernels script.  Added test for Ephemeris code. Fixed bug in proj4 string by adding the axes.
</commit_message>
<xml_diff>
--- a/dert/doc/Icons.pptx
+++ b/dert/doc/Icons.pptx
@@ -50,6 +50,8 @@
     <p:sldId id="304" r:id="rId44"/>
     <p:sldId id="305" r:id="rId45"/>
     <p:sldId id="302" r:id="rId46"/>
+    <p:sldId id="306" r:id="rId47"/>
+    <p:sldId id="307" r:id="rId48"/>
   </p:sldIdLst>
   <p:sldSz cx="9144000" cy="6858000" type="screen4x3"/>
   <p:notesSz cx="6858000" cy="9144000"/>
@@ -332,7 +334,7 @@
           <a:p>
             <a:fld id="{E988B1C8-4186-F54F-A582-F7FEE240AB22}" type="datetimeFigureOut">
               <a:rPr lang="en-US" smtClean="0"/>
-              <a:t>11/6/15</a:t>
+              <a:t>3/29/16</a:t>
             </a:fld>
             <a:endParaRPr lang="en-US"/>
           </a:p>
@@ -502,7 +504,7 @@
           <a:p>
             <a:fld id="{E988B1C8-4186-F54F-A582-F7FEE240AB22}" type="datetimeFigureOut">
               <a:rPr lang="en-US" smtClean="0"/>
-              <a:t>11/6/15</a:t>
+              <a:t>3/29/16</a:t>
             </a:fld>
             <a:endParaRPr lang="en-US"/>
           </a:p>
@@ -682,7 +684,7 @@
           <a:p>
             <a:fld id="{E988B1C8-4186-F54F-A582-F7FEE240AB22}" type="datetimeFigureOut">
               <a:rPr lang="en-US" smtClean="0"/>
-              <a:t>11/6/15</a:t>
+              <a:t>3/29/16</a:t>
             </a:fld>
             <a:endParaRPr lang="en-US"/>
           </a:p>
@@ -852,7 +854,7 @@
           <a:p>
             <a:fld id="{E988B1C8-4186-F54F-A582-F7FEE240AB22}" type="datetimeFigureOut">
               <a:rPr lang="en-US" smtClean="0"/>
-              <a:t>11/6/15</a:t>
+              <a:t>3/29/16</a:t>
             </a:fld>
             <a:endParaRPr lang="en-US"/>
           </a:p>
@@ -1098,7 +1100,7 @@
           <a:p>
             <a:fld id="{E988B1C8-4186-F54F-A582-F7FEE240AB22}" type="datetimeFigureOut">
               <a:rPr lang="en-US" smtClean="0"/>
-              <a:t>11/6/15</a:t>
+              <a:t>3/29/16</a:t>
             </a:fld>
             <a:endParaRPr lang="en-US"/>
           </a:p>
@@ -1386,7 +1388,7 @@
           <a:p>
             <a:fld id="{E988B1C8-4186-F54F-A582-F7FEE240AB22}" type="datetimeFigureOut">
               <a:rPr lang="en-US" smtClean="0"/>
-              <a:t>11/6/15</a:t>
+              <a:t>3/29/16</a:t>
             </a:fld>
             <a:endParaRPr lang="en-US"/>
           </a:p>
@@ -1808,7 +1810,7 @@
           <a:p>
             <a:fld id="{E988B1C8-4186-F54F-A582-F7FEE240AB22}" type="datetimeFigureOut">
               <a:rPr lang="en-US" smtClean="0"/>
-              <a:t>11/6/15</a:t>
+              <a:t>3/29/16</a:t>
             </a:fld>
             <a:endParaRPr lang="en-US"/>
           </a:p>
@@ -1926,7 +1928,7 @@
           <a:p>
             <a:fld id="{E988B1C8-4186-F54F-A582-F7FEE240AB22}" type="datetimeFigureOut">
               <a:rPr lang="en-US" smtClean="0"/>
-              <a:t>11/6/15</a:t>
+              <a:t>3/29/16</a:t>
             </a:fld>
             <a:endParaRPr lang="en-US"/>
           </a:p>
@@ -2021,7 +2023,7 @@
           <a:p>
             <a:fld id="{E988B1C8-4186-F54F-A582-F7FEE240AB22}" type="datetimeFigureOut">
               <a:rPr lang="en-US" smtClean="0"/>
-              <a:t>11/6/15</a:t>
+              <a:t>3/29/16</a:t>
             </a:fld>
             <a:endParaRPr lang="en-US"/>
           </a:p>
@@ -2298,7 +2300,7 @@
           <a:p>
             <a:fld id="{E988B1C8-4186-F54F-A582-F7FEE240AB22}" type="datetimeFigureOut">
               <a:rPr lang="en-US" smtClean="0"/>
-              <a:t>11/6/15</a:t>
+              <a:t>3/29/16</a:t>
             </a:fld>
             <a:endParaRPr lang="en-US"/>
           </a:p>
@@ -2551,7 +2553,7 @@
           <a:p>
             <a:fld id="{E988B1C8-4186-F54F-A582-F7FEE240AB22}" type="datetimeFigureOut">
               <a:rPr lang="en-US" smtClean="0"/>
-              <a:t>11/6/15</a:t>
+              <a:t>3/29/16</a:t>
             </a:fld>
             <a:endParaRPr lang="en-US"/>
           </a:p>
@@ -2764,7 +2766,7 @@
           <a:p>
             <a:fld id="{E988B1C8-4186-F54F-A582-F7FEE240AB22}" type="datetimeFigureOut">
               <a:rPr lang="en-US" smtClean="0"/>
-              <a:t>11/6/15</a:t>
+              <a:t>3/29/16</a:t>
             </a:fld>
             <a:endParaRPr lang="en-US"/>
           </a:p>
@@ -13207,6 +13209,1215 @@
     <p:extLst>
       <p:ext uri="{BB962C8B-B14F-4D97-AF65-F5344CB8AC3E}">
         <p14:creationId xmlns:p14="http://schemas.microsoft.com/office/powerpoint/2010/main" val="1387979101"/>
+      </p:ext>
+    </p:extLst>
+  </p:cSld>
+  <p:clrMapOvr>
+    <a:masterClrMapping/>
+  </p:clrMapOvr>
+</p:sld>
+</file>
+
+<file path=ppt/slides/slide46.xml><?xml version="1.0" encoding="utf-8"?>
+<p:sld xmlns:a="http://schemas.openxmlformats.org/drawingml/2006/main" xmlns:r="http://schemas.openxmlformats.org/officeDocument/2006/relationships" xmlns:p="http://schemas.openxmlformats.org/presentationml/2006/main">
+  <p:cSld>
+    <p:spTree>
+      <p:nvGrpSpPr>
+        <p:cNvPr id="1" name=""/>
+        <p:cNvGrpSpPr/>
+        <p:nvPr/>
+      </p:nvGrpSpPr>
+      <p:grpSpPr>
+        <a:xfrm>
+          <a:off x="0" y="0"/>
+          <a:ext cx="0" cy="0"/>
+          <a:chOff x="0" y="0"/>
+          <a:chExt cx="0" cy="0"/>
+        </a:xfrm>
+      </p:grpSpPr>
+      <p:sp>
+        <p:nvSpPr>
+          <p:cNvPr id="2" name="Oval 1"/>
+          <p:cNvSpPr/>
+          <p:nvPr/>
+        </p:nvSpPr>
+        <p:spPr>
+          <a:xfrm>
+            <a:off x="2451100" y="1295400"/>
+            <a:ext cx="4114800" cy="4114800"/>
+          </a:xfrm>
+          <a:prstGeom prst="ellipse">
+            <a:avLst/>
+          </a:prstGeom>
+          <a:noFill/>
+          <a:ln w="76200" cmpd="sng">
+            <a:solidFill>
+              <a:schemeClr val="tx1"/>
+            </a:solidFill>
+          </a:ln>
+          <a:effectLst/>
+        </p:spPr>
+        <p:style>
+          <a:lnRef idx="1">
+            <a:schemeClr val="accent1"/>
+          </a:lnRef>
+          <a:fillRef idx="3">
+            <a:schemeClr val="accent1"/>
+          </a:fillRef>
+          <a:effectRef idx="2">
+            <a:schemeClr val="accent1"/>
+          </a:effectRef>
+          <a:fontRef idx="minor">
+            <a:schemeClr val="lt1"/>
+          </a:fontRef>
+        </p:style>
+        <p:txBody>
+          <a:bodyPr rtlCol="0" anchor="ctr"/>
+          <a:lstStyle/>
+          <a:p>
+            <a:pPr algn="ctr"/>
+            <a:endParaRPr lang="en-US"/>
+          </a:p>
+        </p:txBody>
+      </p:sp>
+      <p:sp>
+        <p:nvSpPr>
+          <p:cNvPr id="4" name="Arc 3"/>
+          <p:cNvSpPr/>
+          <p:nvPr/>
+        </p:nvSpPr>
+        <p:spPr>
+          <a:xfrm>
+            <a:off x="2704306" y="1295400"/>
+            <a:ext cx="3608388" cy="4102100"/>
+          </a:xfrm>
+          <a:prstGeom prst="arc">
+            <a:avLst>
+              <a:gd name="adj1" fmla="val 16200000"/>
+              <a:gd name="adj2" fmla="val 5412291"/>
+            </a:avLst>
+          </a:prstGeom>
+          <a:ln w="76200" cmpd="sng">
+            <a:solidFill>
+              <a:schemeClr val="tx1"/>
+            </a:solidFill>
+          </a:ln>
+          <a:effectLst/>
+        </p:spPr>
+        <p:style>
+          <a:lnRef idx="2">
+            <a:schemeClr val="accent1"/>
+          </a:lnRef>
+          <a:fillRef idx="0">
+            <a:schemeClr val="accent1"/>
+          </a:fillRef>
+          <a:effectRef idx="1">
+            <a:schemeClr val="accent1"/>
+          </a:effectRef>
+          <a:fontRef idx="minor">
+            <a:schemeClr val="tx1"/>
+          </a:fontRef>
+        </p:style>
+        <p:txBody>
+          <a:bodyPr rtlCol="0" anchor="ctr"/>
+          <a:lstStyle/>
+          <a:p>
+            <a:pPr algn="ctr"/>
+            <a:endParaRPr lang="en-US"/>
+          </a:p>
+        </p:txBody>
+      </p:sp>
+      <p:sp>
+        <p:nvSpPr>
+          <p:cNvPr id="7" name="Arc 6"/>
+          <p:cNvSpPr/>
+          <p:nvPr/>
+        </p:nvSpPr>
+        <p:spPr>
+          <a:xfrm>
+            <a:off x="3171825" y="1295400"/>
+            <a:ext cx="2673350" cy="4102100"/>
+          </a:xfrm>
+          <a:prstGeom prst="arc">
+            <a:avLst>
+              <a:gd name="adj1" fmla="val 16200000"/>
+              <a:gd name="adj2" fmla="val 5412291"/>
+            </a:avLst>
+          </a:prstGeom>
+          <a:ln w="76200" cmpd="sng">
+            <a:solidFill>
+              <a:schemeClr val="tx1"/>
+            </a:solidFill>
+          </a:ln>
+          <a:effectLst/>
+        </p:spPr>
+        <p:style>
+          <a:lnRef idx="2">
+            <a:schemeClr val="accent1"/>
+          </a:lnRef>
+          <a:fillRef idx="0">
+            <a:schemeClr val="accent1"/>
+          </a:fillRef>
+          <a:effectRef idx="1">
+            <a:schemeClr val="accent1"/>
+          </a:effectRef>
+          <a:fontRef idx="minor">
+            <a:schemeClr val="tx1"/>
+          </a:fontRef>
+        </p:style>
+        <p:txBody>
+          <a:bodyPr rtlCol="0" anchor="ctr"/>
+          <a:lstStyle/>
+          <a:p>
+            <a:pPr algn="ctr"/>
+            <a:endParaRPr lang="en-US"/>
+          </a:p>
+        </p:txBody>
+      </p:sp>
+      <p:sp>
+        <p:nvSpPr>
+          <p:cNvPr id="8" name="Arc 7"/>
+          <p:cNvSpPr/>
+          <p:nvPr/>
+        </p:nvSpPr>
+        <p:spPr>
+          <a:xfrm>
+            <a:off x="3821113" y="1295400"/>
+            <a:ext cx="1246187" cy="4102100"/>
+          </a:xfrm>
+          <a:prstGeom prst="arc">
+            <a:avLst>
+              <a:gd name="adj1" fmla="val 16200000"/>
+              <a:gd name="adj2" fmla="val 5412291"/>
+            </a:avLst>
+          </a:prstGeom>
+          <a:ln w="76200" cmpd="sng">
+            <a:solidFill>
+              <a:schemeClr val="tx1"/>
+            </a:solidFill>
+          </a:ln>
+          <a:effectLst/>
+        </p:spPr>
+        <p:style>
+          <a:lnRef idx="2">
+            <a:schemeClr val="accent1"/>
+          </a:lnRef>
+          <a:fillRef idx="0">
+            <a:schemeClr val="accent1"/>
+          </a:fillRef>
+          <a:effectRef idx="1">
+            <a:schemeClr val="accent1"/>
+          </a:effectRef>
+          <a:fontRef idx="minor">
+            <a:schemeClr val="tx1"/>
+          </a:fontRef>
+        </p:style>
+        <p:txBody>
+          <a:bodyPr rtlCol="0" anchor="ctr"/>
+          <a:lstStyle/>
+          <a:p>
+            <a:pPr algn="ctr"/>
+            <a:endParaRPr lang="en-US"/>
+          </a:p>
+        </p:txBody>
+      </p:sp>
+      <p:sp>
+        <p:nvSpPr>
+          <p:cNvPr id="12" name="Arc 11"/>
+          <p:cNvSpPr/>
+          <p:nvPr/>
+        </p:nvSpPr>
+        <p:spPr>
+          <a:xfrm flipH="1">
+            <a:off x="2704306" y="1295400"/>
+            <a:ext cx="3608388" cy="4102100"/>
+          </a:xfrm>
+          <a:prstGeom prst="arc">
+            <a:avLst>
+              <a:gd name="adj1" fmla="val 16200000"/>
+              <a:gd name="adj2" fmla="val 5412291"/>
+            </a:avLst>
+          </a:prstGeom>
+          <a:ln w="76200" cmpd="sng">
+            <a:solidFill>
+              <a:schemeClr val="tx1"/>
+            </a:solidFill>
+          </a:ln>
+          <a:effectLst/>
+        </p:spPr>
+        <p:style>
+          <a:lnRef idx="2">
+            <a:schemeClr val="accent1"/>
+          </a:lnRef>
+          <a:fillRef idx="0">
+            <a:schemeClr val="accent1"/>
+          </a:fillRef>
+          <a:effectRef idx="1">
+            <a:schemeClr val="accent1"/>
+          </a:effectRef>
+          <a:fontRef idx="minor">
+            <a:schemeClr val="tx1"/>
+          </a:fontRef>
+        </p:style>
+        <p:txBody>
+          <a:bodyPr rtlCol="0" anchor="ctr"/>
+          <a:lstStyle/>
+          <a:p>
+            <a:pPr algn="ctr"/>
+            <a:endParaRPr lang="en-US"/>
+          </a:p>
+        </p:txBody>
+      </p:sp>
+      <p:sp>
+        <p:nvSpPr>
+          <p:cNvPr id="13" name="Arc 12"/>
+          <p:cNvSpPr/>
+          <p:nvPr/>
+        </p:nvSpPr>
+        <p:spPr>
+          <a:xfrm flipH="1">
+            <a:off x="3171825" y="1295400"/>
+            <a:ext cx="2673350" cy="4102100"/>
+          </a:xfrm>
+          <a:prstGeom prst="arc">
+            <a:avLst>
+              <a:gd name="adj1" fmla="val 16200000"/>
+              <a:gd name="adj2" fmla="val 5412291"/>
+            </a:avLst>
+          </a:prstGeom>
+          <a:ln w="76200" cmpd="sng">
+            <a:solidFill>
+              <a:schemeClr val="tx1"/>
+            </a:solidFill>
+          </a:ln>
+          <a:effectLst/>
+        </p:spPr>
+        <p:style>
+          <a:lnRef idx="2">
+            <a:schemeClr val="accent1"/>
+          </a:lnRef>
+          <a:fillRef idx="0">
+            <a:schemeClr val="accent1"/>
+          </a:fillRef>
+          <a:effectRef idx="1">
+            <a:schemeClr val="accent1"/>
+          </a:effectRef>
+          <a:fontRef idx="minor">
+            <a:schemeClr val="tx1"/>
+          </a:fontRef>
+        </p:style>
+        <p:txBody>
+          <a:bodyPr rtlCol="0" anchor="ctr"/>
+          <a:lstStyle/>
+          <a:p>
+            <a:pPr algn="ctr"/>
+            <a:endParaRPr lang="en-US"/>
+          </a:p>
+        </p:txBody>
+      </p:sp>
+      <p:sp>
+        <p:nvSpPr>
+          <p:cNvPr id="14" name="Arc 13"/>
+          <p:cNvSpPr/>
+          <p:nvPr/>
+        </p:nvSpPr>
+        <p:spPr>
+          <a:xfrm flipH="1">
+            <a:off x="3924299" y="1295400"/>
+            <a:ext cx="1271586" cy="4102100"/>
+          </a:xfrm>
+          <a:prstGeom prst="arc">
+            <a:avLst>
+              <a:gd name="adj1" fmla="val 16200000"/>
+              <a:gd name="adj2" fmla="val 5412291"/>
+            </a:avLst>
+          </a:prstGeom>
+          <a:ln w="76200" cmpd="sng">
+            <a:solidFill>
+              <a:schemeClr val="tx1"/>
+            </a:solidFill>
+          </a:ln>
+          <a:effectLst/>
+        </p:spPr>
+        <p:style>
+          <a:lnRef idx="2">
+            <a:schemeClr val="accent1"/>
+          </a:lnRef>
+          <a:fillRef idx="0">
+            <a:schemeClr val="accent1"/>
+          </a:fillRef>
+          <a:effectRef idx="1">
+            <a:schemeClr val="accent1"/>
+          </a:effectRef>
+          <a:fontRef idx="minor">
+            <a:schemeClr val="tx1"/>
+          </a:fontRef>
+        </p:style>
+        <p:txBody>
+          <a:bodyPr rtlCol="0" anchor="ctr"/>
+          <a:lstStyle/>
+          <a:p>
+            <a:pPr algn="ctr"/>
+            <a:endParaRPr lang="en-US"/>
+          </a:p>
+        </p:txBody>
+      </p:sp>
+      <p:cxnSp>
+        <p:nvCxnSpPr>
+          <p:cNvPr id="16" name="Straight Connector 15"/>
+          <p:cNvCxnSpPr>
+            <a:stCxn id="2" idx="2"/>
+            <a:endCxn id="2" idx="6"/>
+          </p:cNvCxnSpPr>
+          <p:nvPr/>
+        </p:nvCxnSpPr>
+        <p:spPr>
+          <a:xfrm>
+            <a:off x="2451100" y="3352800"/>
+            <a:ext cx="4114800" cy="0"/>
+          </a:xfrm>
+          <a:prstGeom prst="line">
+            <a:avLst/>
+          </a:prstGeom>
+          <a:ln w="76200" cmpd="sng">
+            <a:solidFill>
+              <a:schemeClr val="tx1"/>
+            </a:solidFill>
+          </a:ln>
+          <a:effectLst/>
+        </p:spPr>
+        <p:style>
+          <a:lnRef idx="2">
+            <a:schemeClr val="accent1"/>
+          </a:lnRef>
+          <a:fillRef idx="0">
+            <a:schemeClr val="accent1"/>
+          </a:fillRef>
+          <a:effectRef idx="1">
+            <a:schemeClr val="accent1"/>
+          </a:effectRef>
+          <a:fontRef idx="minor">
+            <a:schemeClr val="tx1"/>
+          </a:fontRef>
+        </p:style>
+      </p:cxnSp>
+      <p:cxnSp>
+        <p:nvCxnSpPr>
+          <p:cNvPr id="18" name="Straight Connector 17"/>
+          <p:cNvCxnSpPr/>
+          <p:nvPr/>
+        </p:nvCxnSpPr>
+        <p:spPr>
+          <a:xfrm>
+            <a:off x="2654300" y="2451100"/>
+            <a:ext cx="3721100" cy="0"/>
+          </a:xfrm>
+          <a:prstGeom prst="line">
+            <a:avLst/>
+          </a:prstGeom>
+          <a:ln w="76200" cmpd="sng">
+            <a:solidFill>
+              <a:schemeClr val="tx1"/>
+            </a:solidFill>
+          </a:ln>
+          <a:effectLst/>
+        </p:spPr>
+        <p:style>
+          <a:lnRef idx="2">
+            <a:schemeClr val="accent1"/>
+          </a:lnRef>
+          <a:fillRef idx="0">
+            <a:schemeClr val="accent1"/>
+          </a:fillRef>
+          <a:effectRef idx="1">
+            <a:schemeClr val="accent1"/>
+          </a:effectRef>
+          <a:fontRef idx="minor">
+            <a:schemeClr val="tx1"/>
+          </a:fontRef>
+        </p:style>
+      </p:cxnSp>
+      <p:cxnSp>
+        <p:nvCxnSpPr>
+          <p:cNvPr id="20" name="Straight Connector 19"/>
+          <p:cNvCxnSpPr/>
+          <p:nvPr/>
+        </p:nvCxnSpPr>
+        <p:spPr>
+          <a:xfrm>
+            <a:off x="3175000" y="1778000"/>
+            <a:ext cx="2654300" cy="0"/>
+          </a:xfrm>
+          <a:prstGeom prst="line">
+            <a:avLst/>
+          </a:prstGeom>
+          <a:ln w="76200" cmpd="sng">
+            <a:solidFill>
+              <a:srgbClr val="000000"/>
+            </a:solidFill>
+          </a:ln>
+          <a:effectLst/>
+        </p:spPr>
+        <p:style>
+          <a:lnRef idx="2">
+            <a:schemeClr val="accent1"/>
+          </a:lnRef>
+          <a:fillRef idx="0">
+            <a:schemeClr val="accent1"/>
+          </a:fillRef>
+          <a:effectRef idx="1">
+            <a:schemeClr val="accent1"/>
+          </a:effectRef>
+          <a:fontRef idx="minor">
+            <a:schemeClr val="tx1"/>
+          </a:fontRef>
+        </p:style>
+      </p:cxnSp>
+      <p:cxnSp>
+        <p:nvCxnSpPr>
+          <p:cNvPr id="23" name="Straight Connector 22"/>
+          <p:cNvCxnSpPr/>
+          <p:nvPr/>
+        </p:nvCxnSpPr>
+        <p:spPr>
+          <a:xfrm>
+            <a:off x="2667000" y="4267200"/>
+            <a:ext cx="3683000" cy="0"/>
+          </a:xfrm>
+          <a:prstGeom prst="line">
+            <a:avLst/>
+          </a:prstGeom>
+          <a:ln w="76200" cmpd="sng">
+            <a:solidFill>
+              <a:schemeClr val="tx1"/>
+            </a:solidFill>
+          </a:ln>
+          <a:effectLst/>
+        </p:spPr>
+        <p:style>
+          <a:lnRef idx="2">
+            <a:schemeClr val="accent1"/>
+          </a:lnRef>
+          <a:fillRef idx="0">
+            <a:schemeClr val="accent1"/>
+          </a:fillRef>
+          <a:effectRef idx="1">
+            <a:schemeClr val="accent1"/>
+          </a:effectRef>
+          <a:fontRef idx="minor">
+            <a:schemeClr val="tx1"/>
+          </a:fontRef>
+        </p:style>
+      </p:cxnSp>
+      <p:cxnSp>
+        <p:nvCxnSpPr>
+          <p:cNvPr id="24" name="Straight Connector 23"/>
+          <p:cNvCxnSpPr/>
+          <p:nvPr/>
+        </p:nvCxnSpPr>
+        <p:spPr>
+          <a:xfrm>
+            <a:off x="3187700" y="4940300"/>
+            <a:ext cx="2637367" cy="0"/>
+          </a:xfrm>
+          <a:prstGeom prst="line">
+            <a:avLst/>
+          </a:prstGeom>
+          <a:ln w="76200" cmpd="sng">
+            <a:solidFill>
+              <a:srgbClr val="000000"/>
+            </a:solidFill>
+          </a:ln>
+          <a:effectLst/>
+        </p:spPr>
+        <p:style>
+          <a:lnRef idx="2">
+            <a:schemeClr val="accent1"/>
+          </a:lnRef>
+          <a:fillRef idx="0">
+            <a:schemeClr val="accent1"/>
+          </a:fillRef>
+          <a:effectRef idx="1">
+            <a:schemeClr val="accent1"/>
+          </a:effectRef>
+          <a:fontRef idx="minor">
+            <a:schemeClr val="tx1"/>
+          </a:fontRef>
+        </p:style>
+      </p:cxnSp>
+    </p:spTree>
+    <p:extLst>
+      <p:ext uri="{BB962C8B-B14F-4D97-AF65-F5344CB8AC3E}">
+        <p14:creationId xmlns:p14="http://schemas.microsoft.com/office/powerpoint/2010/main" val="597060449"/>
+      </p:ext>
+    </p:extLst>
+  </p:cSld>
+  <p:clrMapOvr>
+    <a:masterClrMapping/>
+  </p:clrMapOvr>
+</p:sld>
+</file>
+
+<file path=ppt/slides/slide47.xml><?xml version="1.0" encoding="utf-8"?>
+<p:sld xmlns:a="http://schemas.openxmlformats.org/drawingml/2006/main" xmlns:r="http://schemas.openxmlformats.org/officeDocument/2006/relationships" xmlns:p="http://schemas.openxmlformats.org/presentationml/2006/main">
+  <p:cSld>
+    <p:spTree>
+      <p:nvGrpSpPr>
+        <p:cNvPr id="1" name=""/>
+        <p:cNvGrpSpPr/>
+        <p:nvPr/>
+      </p:nvGrpSpPr>
+      <p:grpSpPr>
+        <a:xfrm>
+          <a:off x="0" y="0"/>
+          <a:ext cx="0" cy="0"/>
+          <a:chOff x="0" y="0"/>
+          <a:chExt cx="0" cy="0"/>
+        </a:xfrm>
+      </p:grpSpPr>
+      <p:sp>
+        <p:nvSpPr>
+          <p:cNvPr id="2" name="Oval 1"/>
+          <p:cNvSpPr/>
+          <p:nvPr/>
+        </p:nvSpPr>
+        <p:spPr>
+          <a:xfrm>
+            <a:off x="2451100" y="1295400"/>
+            <a:ext cx="4114800" cy="4114800"/>
+          </a:xfrm>
+          <a:prstGeom prst="ellipse">
+            <a:avLst/>
+          </a:prstGeom>
+          <a:noFill/>
+          <a:ln w="76200" cmpd="sng">
+            <a:solidFill>
+              <a:schemeClr val="tx1"/>
+            </a:solidFill>
+          </a:ln>
+          <a:effectLst/>
+        </p:spPr>
+        <p:style>
+          <a:lnRef idx="1">
+            <a:schemeClr val="accent1"/>
+          </a:lnRef>
+          <a:fillRef idx="3">
+            <a:schemeClr val="accent1"/>
+          </a:fillRef>
+          <a:effectRef idx="2">
+            <a:schemeClr val="accent1"/>
+          </a:effectRef>
+          <a:fontRef idx="minor">
+            <a:schemeClr val="lt1"/>
+          </a:fontRef>
+        </p:style>
+        <p:txBody>
+          <a:bodyPr rtlCol="0" anchor="ctr"/>
+          <a:lstStyle/>
+          <a:p>
+            <a:pPr algn="ctr"/>
+            <a:endParaRPr lang="en-US"/>
+          </a:p>
+        </p:txBody>
+      </p:sp>
+      <p:sp>
+        <p:nvSpPr>
+          <p:cNvPr id="4" name="Arc 3"/>
+          <p:cNvSpPr/>
+          <p:nvPr/>
+        </p:nvSpPr>
+        <p:spPr>
+          <a:xfrm>
+            <a:off x="2704306" y="1295400"/>
+            <a:ext cx="3608388" cy="4102100"/>
+          </a:xfrm>
+          <a:prstGeom prst="arc">
+            <a:avLst>
+              <a:gd name="adj1" fmla="val 16200000"/>
+              <a:gd name="adj2" fmla="val 5412291"/>
+            </a:avLst>
+          </a:prstGeom>
+          <a:ln w="76200" cmpd="sng">
+            <a:solidFill>
+              <a:schemeClr val="tx1"/>
+            </a:solidFill>
+          </a:ln>
+          <a:effectLst/>
+        </p:spPr>
+        <p:style>
+          <a:lnRef idx="2">
+            <a:schemeClr val="accent1"/>
+          </a:lnRef>
+          <a:fillRef idx="0">
+            <a:schemeClr val="accent1"/>
+          </a:fillRef>
+          <a:effectRef idx="1">
+            <a:schemeClr val="accent1"/>
+          </a:effectRef>
+          <a:fontRef idx="minor">
+            <a:schemeClr val="tx1"/>
+          </a:fontRef>
+        </p:style>
+        <p:txBody>
+          <a:bodyPr rtlCol="0" anchor="ctr"/>
+          <a:lstStyle/>
+          <a:p>
+            <a:pPr algn="ctr"/>
+            <a:endParaRPr lang="en-US"/>
+          </a:p>
+        </p:txBody>
+      </p:sp>
+      <p:sp>
+        <p:nvSpPr>
+          <p:cNvPr id="7" name="Arc 6"/>
+          <p:cNvSpPr/>
+          <p:nvPr/>
+        </p:nvSpPr>
+        <p:spPr>
+          <a:xfrm>
+            <a:off x="3171825" y="1295400"/>
+            <a:ext cx="2673350" cy="4102100"/>
+          </a:xfrm>
+          <a:prstGeom prst="arc">
+            <a:avLst>
+              <a:gd name="adj1" fmla="val 16200000"/>
+              <a:gd name="adj2" fmla="val 5412291"/>
+            </a:avLst>
+          </a:prstGeom>
+          <a:ln w="76200" cmpd="sng">
+            <a:solidFill>
+              <a:schemeClr val="tx1"/>
+            </a:solidFill>
+          </a:ln>
+          <a:effectLst/>
+        </p:spPr>
+        <p:style>
+          <a:lnRef idx="2">
+            <a:schemeClr val="accent1"/>
+          </a:lnRef>
+          <a:fillRef idx="0">
+            <a:schemeClr val="accent1"/>
+          </a:fillRef>
+          <a:effectRef idx="1">
+            <a:schemeClr val="accent1"/>
+          </a:effectRef>
+          <a:fontRef idx="minor">
+            <a:schemeClr val="tx1"/>
+          </a:fontRef>
+        </p:style>
+        <p:txBody>
+          <a:bodyPr rtlCol="0" anchor="ctr"/>
+          <a:lstStyle/>
+          <a:p>
+            <a:pPr algn="ctr"/>
+            <a:endParaRPr lang="en-US"/>
+          </a:p>
+        </p:txBody>
+      </p:sp>
+      <p:sp>
+        <p:nvSpPr>
+          <p:cNvPr id="8" name="Arc 7"/>
+          <p:cNvSpPr/>
+          <p:nvPr/>
+        </p:nvSpPr>
+        <p:spPr>
+          <a:xfrm>
+            <a:off x="3821113" y="1295400"/>
+            <a:ext cx="1246187" cy="4102100"/>
+          </a:xfrm>
+          <a:prstGeom prst="arc">
+            <a:avLst>
+              <a:gd name="adj1" fmla="val 16200000"/>
+              <a:gd name="adj2" fmla="val 5412291"/>
+            </a:avLst>
+          </a:prstGeom>
+          <a:ln w="76200" cmpd="sng">
+            <a:solidFill>
+              <a:schemeClr val="tx1"/>
+            </a:solidFill>
+          </a:ln>
+          <a:effectLst/>
+        </p:spPr>
+        <p:style>
+          <a:lnRef idx="2">
+            <a:schemeClr val="accent1"/>
+          </a:lnRef>
+          <a:fillRef idx="0">
+            <a:schemeClr val="accent1"/>
+          </a:fillRef>
+          <a:effectRef idx="1">
+            <a:schemeClr val="accent1"/>
+          </a:effectRef>
+          <a:fontRef idx="minor">
+            <a:schemeClr val="tx1"/>
+          </a:fontRef>
+        </p:style>
+        <p:txBody>
+          <a:bodyPr rtlCol="0" anchor="ctr"/>
+          <a:lstStyle/>
+          <a:p>
+            <a:pPr algn="ctr"/>
+            <a:endParaRPr lang="en-US"/>
+          </a:p>
+        </p:txBody>
+      </p:sp>
+      <p:sp>
+        <p:nvSpPr>
+          <p:cNvPr id="12" name="Arc 11"/>
+          <p:cNvSpPr/>
+          <p:nvPr/>
+        </p:nvSpPr>
+        <p:spPr>
+          <a:xfrm flipH="1">
+            <a:off x="2704306" y="1295400"/>
+            <a:ext cx="3608388" cy="4102100"/>
+          </a:xfrm>
+          <a:prstGeom prst="arc">
+            <a:avLst>
+              <a:gd name="adj1" fmla="val 16200000"/>
+              <a:gd name="adj2" fmla="val 5412291"/>
+            </a:avLst>
+          </a:prstGeom>
+          <a:ln w="76200" cmpd="sng">
+            <a:solidFill>
+              <a:schemeClr val="tx1"/>
+            </a:solidFill>
+          </a:ln>
+          <a:effectLst/>
+        </p:spPr>
+        <p:style>
+          <a:lnRef idx="2">
+            <a:schemeClr val="accent1"/>
+          </a:lnRef>
+          <a:fillRef idx="0">
+            <a:schemeClr val="accent1"/>
+          </a:fillRef>
+          <a:effectRef idx="1">
+            <a:schemeClr val="accent1"/>
+          </a:effectRef>
+          <a:fontRef idx="minor">
+            <a:schemeClr val="tx1"/>
+          </a:fontRef>
+        </p:style>
+        <p:txBody>
+          <a:bodyPr rtlCol="0" anchor="ctr"/>
+          <a:lstStyle/>
+          <a:p>
+            <a:pPr algn="ctr"/>
+            <a:endParaRPr lang="en-US"/>
+          </a:p>
+        </p:txBody>
+      </p:sp>
+      <p:sp>
+        <p:nvSpPr>
+          <p:cNvPr id="13" name="Arc 12"/>
+          <p:cNvSpPr/>
+          <p:nvPr/>
+        </p:nvSpPr>
+        <p:spPr>
+          <a:xfrm flipH="1">
+            <a:off x="3171825" y="1295400"/>
+            <a:ext cx="2673350" cy="4102100"/>
+          </a:xfrm>
+          <a:prstGeom prst="arc">
+            <a:avLst>
+              <a:gd name="adj1" fmla="val 16200000"/>
+              <a:gd name="adj2" fmla="val 5412291"/>
+            </a:avLst>
+          </a:prstGeom>
+          <a:ln w="76200" cmpd="sng">
+            <a:solidFill>
+              <a:schemeClr val="tx1"/>
+            </a:solidFill>
+          </a:ln>
+          <a:effectLst/>
+        </p:spPr>
+        <p:style>
+          <a:lnRef idx="2">
+            <a:schemeClr val="accent1"/>
+          </a:lnRef>
+          <a:fillRef idx="0">
+            <a:schemeClr val="accent1"/>
+          </a:fillRef>
+          <a:effectRef idx="1">
+            <a:schemeClr val="accent1"/>
+          </a:effectRef>
+          <a:fontRef idx="minor">
+            <a:schemeClr val="tx1"/>
+          </a:fontRef>
+        </p:style>
+        <p:txBody>
+          <a:bodyPr rtlCol="0" anchor="ctr"/>
+          <a:lstStyle/>
+          <a:p>
+            <a:pPr algn="ctr"/>
+            <a:endParaRPr lang="en-US"/>
+          </a:p>
+        </p:txBody>
+      </p:sp>
+      <p:sp>
+        <p:nvSpPr>
+          <p:cNvPr id="14" name="Arc 13"/>
+          <p:cNvSpPr/>
+          <p:nvPr/>
+        </p:nvSpPr>
+        <p:spPr>
+          <a:xfrm flipH="1">
+            <a:off x="3924299" y="1295400"/>
+            <a:ext cx="1271586" cy="4102100"/>
+          </a:xfrm>
+          <a:prstGeom prst="arc">
+            <a:avLst>
+              <a:gd name="adj1" fmla="val 16200000"/>
+              <a:gd name="adj2" fmla="val 5412291"/>
+            </a:avLst>
+          </a:prstGeom>
+          <a:ln w="76200" cmpd="sng">
+            <a:solidFill>
+              <a:schemeClr val="tx1"/>
+            </a:solidFill>
+          </a:ln>
+          <a:effectLst/>
+        </p:spPr>
+        <p:style>
+          <a:lnRef idx="2">
+            <a:schemeClr val="accent1"/>
+          </a:lnRef>
+          <a:fillRef idx="0">
+            <a:schemeClr val="accent1"/>
+          </a:fillRef>
+          <a:effectRef idx="1">
+            <a:schemeClr val="accent1"/>
+          </a:effectRef>
+          <a:fontRef idx="minor">
+            <a:schemeClr val="tx1"/>
+          </a:fontRef>
+        </p:style>
+        <p:txBody>
+          <a:bodyPr rtlCol="0" anchor="ctr"/>
+          <a:lstStyle/>
+          <a:p>
+            <a:pPr algn="ctr"/>
+            <a:endParaRPr lang="en-US"/>
+          </a:p>
+        </p:txBody>
+      </p:sp>
+      <p:cxnSp>
+        <p:nvCxnSpPr>
+          <p:cNvPr id="16" name="Straight Connector 15"/>
+          <p:cNvCxnSpPr>
+            <a:stCxn id="2" idx="2"/>
+            <a:endCxn id="2" idx="6"/>
+          </p:cNvCxnSpPr>
+          <p:nvPr/>
+        </p:nvCxnSpPr>
+        <p:spPr>
+          <a:xfrm>
+            <a:off x="2451100" y="3352800"/>
+            <a:ext cx="4114800" cy="0"/>
+          </a:xfrm>
+          <a:prstGeom prst="line">
+            <a:avLst/>
+          </a:prstGeom>
+          <a:ln w="76200" cmpd="sng">
+            <a:solidFill>
+              <a:schemeClr val="tx1"/>
+            </a:solidFill>
+          </a:ln>
+          <a:effectLst/>
+        </p:spPr>
+        <p:style>
+          <a:lnRef idx="2">
+            <a:schemeClr val="accent1"/>
+          </a:lnRef>
+          <a:fillRef idx="0">
+            <a:schemeClr val="accent1"/>
+          </a:fillRef>
+          <a:effectRef idx="1">
+            <a:schemeClr val="accent1"/>
+          </a:effectRef>
+          <a:fontRef idx="minor">
+            <a:schemeClr val="tx1"/>
+          </a:fontRef>
+        </p:style>
+      </p:cxnSp>
+      <p:cxnSp>
+        <p:nvCxnSpPr>
+          <p:cNvPr id="18" name="Straight Connector 17"/>
+          <p:cNvCxnSpPr/>
+          <p:nvPr/>
+        </p:nvCxnSpPr>
+        <p:spPr>
+          <a:xfrm>
+            <a:off x="2654300" y="2451100"/>
+            <a:ext cx="3721100" cy="0"/>
+          </a:xfrm>
+          <a:prstGeom prst="line">
+            <a:avLst/>
+          </a:prstGeom>
+          <a:ln w="76200" cmpd="sng">
+            <a:solidFill>
+              <a:schemeClr val="tx1"/>
+            </a:solidFill>
+          </a:ln>
+          <a:effectLst/>
+        </p:spPr>
+        <p:style>
+          <a:lnRef idx="2">
+            <a:schemeClr val="accent1"/>
+          </a:lnRef>
+          <a:fillRef idx="0">
+            <a:schemeClr val="accent1"/>
+          </a:fillRef>
+          <a:effectRef idx="1">
+            <a:schemeClr val="accent1"/>
+          </a:effectRef>
+          <a:fontRef idx="minor">
+            <a:schemeClr val="tx1"/>
+          </a:fontRef>
+        </p:style>
+      </p:cxnSp>
+      <p:cxnSp>
+        <p:nvCxnSpPr>
+          <p:cNvPr id="20" name="Straight Connector 19"/>
+          <p:cNvCxnSpPr/>
+          <p:nvPr/>
+        </p:nvCxnSpPr>
+        <p:spPr>
+          <a:xfrm>
+            <a:off x="3175000" y="1778000"/>
+            <a:ext cx="2654300" cy="0"/>
+          </a:xfrm>
+          <a:prstGeom prst="line">
+            <a:avLst/>
+          </a:prstGeom>
+          <a:ln w="76200" cmpd="sng">
+            <a:solidFill>
+              <a:srgbClr val="000000"/>
+            </a:solidFill>
+          </a:ln>
+          <a:effectLst/>
+        </p:spPr>
+        <p:style>
+          <a:lnRef idx="2">
+            <a:schemeClr val="accent1"/>
+          </a:lnRef>
+          <a:fillRef idx="0">
+            <a:schemeClr val="accent1"/>
+          </a:fillRef>
+          <a:effectRef idx="1">
+            <a:schemeClr val="accent1"/>
+          </a:effectRef>
+          <a:fontRef idx="minor">
+            <a:schemeClr val="tx1"/>
+          </a:fontRef>
+        </p:style>
+      </p:cxnSp>
+      <p:cxnSp>
+        <p:nvCxnSpPr>
+          <p:cNvPr id="23" name="Straight Connector 22"/>
+          <p:cNvCxnSpPr/>
+          <p:nvPr/>
+        </p:nvCxnSpPr>
+        <p:spPr>
+          <a:xfrm>
+            <a:off x="2667000" y="4267200"/>
+            <a:ext cx="3683000" cy="0"/>
+          </a:xfrm>
+          <a:prstGeom prst="line">
+            <a:avLst/>
+          </a:prstGeom>
+          <a:ln w="76200" cmpd="sng">
+            <a:solidFill>
+              <a:schemeClr val="tx1"/>
+            </a:solidFill>
+          </a:ln>
+          <a:effectLst/>
+        </p:spPr>
+        <p:style>
+          <a:lnRef idx="2">
+            <a:schemeClr val="accent1"/>
+          </a:lnRef>
+          <a:fillRef idx="0">
+            <a:schemeClr val="accent1"/>
+          </a:fillRef>
+          <a:effectRef idx="1">
+            <a:schemeClr val="accent1"/>
+          </a:effectRef>
+          <a:fontRef idx="minor">
+            <a:schemeClr val="tx1"/>
+          </a:fontRef>
+        </p:style>
+      </p:cxnSp>
+      <p:cxnSp>
+        <p:nvCxnSpPr>
+          <p:cNvPr id="24" name="Straight Connector 23"/>
+          <p:cNvCxnSpPr/>
+          <p:nvPr/>
+        </p:nvCxnSpPr>
+        <p:spPr>
+          <a:xfrm>
+            <a:off x="3187700" y="4940300"/>
+            <a:ext cx="2637367" cy="0"/>
+          </a:xfrm>
+          <a:prstGeom prst="line">
+            <a:avLst/>
+          </a:prstGeom>
+          <a:ln w="76200" cmpd="sng">
+            <a:solidFill>
+              <a:srgbClr val="000000"/>
+            </a:solidFill>
+          </a:ln>
+          <a:effectLst/>
+        </p:spPr>
+        <p:style>
+          <a:lnRef idx="2">
+            <a:schemeClr val="accent1"/>
+          </a:lnRef>
+          <a:fillRef idx="0">
+            <a:schemeClr val="accent1"/>
+          </a:fillRef>
+          <a:effectRef idx="1">
+            <a:schemeClr val="accent1"/>
+          </a:effectRef>
+          <a:fontRef idx="minor">
+            <a:schemeClr val="tx1"/>
+          </a:fontRef>
+        </p:style>
+      </p:cxnSp>
+      <p:sp>
+        <p:nvSpPr>
+          <p:cNvPr id="26" name="Freeform 25"/>
+          <p:cNvSpPr/>
+          <p:nvPr/>
+        </p:nvSpPr>
+        <p:spPr>
+          <a:xfrm>
+            <a:off x="2874786" y="2184400"/>
+            <a:ext cx="3068813" cy="2392646"/>
+          </a:xfrm>
+          <a:custGeom>
+            <a:avLst/>
+            <a:gdLst>
+              <a:gd name="connsiteX0" fmla="*/ 61552 w 2487252"/>
+              <a:gd name="connsiteY0" fmla="*/ 876300 h 1720255"/>
+              <a:gd name="connsiteX1" fmla="*/ 112352 w 2487252"/>
+              <a:gd name="connsiteY1" fmla="*/ 901700 h 1720255"/>
+              <a:gd name="connsiteX2" fmla="*/ 1090252 w 2487252"/>
+              <a:gd name="connsiteY2" fmla="*/ 1701800 h 1720255"/>
+              <a:gd name="connsiteX3" fmla="*/ 2487252 w 2487252"/>
+              <a:gd name="connsiteY3" fmla="*/ 0 h 1720255"/>
+              <a:gd name="connsiteX0" fmla="*/ 223657 w 2649357"/>
+              <a:gd name="connsiteY0" fmla="*/ 876300 h 1723311"/>
+              <a:gd name="connsiteX1" fmla="*/ 54828 w 2649357"/>
+              <a:gd name="connsiteY1" fmla="*/ 953687 h 1723311"/>
+              <a:gd name="connsiteX2" fmla="*/ 1252357 w 2649357"/>
+              <a:gd name="connsiteY2" fmla="*/ 1701800 h 1723311"/>
+              <a:gd name="connsiteX3" fmla="*/ 2649357 w 2649357"/>
+              <a:gd name="connsiteY3" fmla="*/ 0 h 1723311"/>
+              <a:gd name="connsiteX0" fmla="*/ 390889 w 2621364"/>
+              <a:gd name="connsiteY0" fmla="*/ 751533 h 1723810"/>
+              <a:gd name="connsiteX1" fmla="*/ 26835 w 2621364"/>
+              <a:gd name="connsiteY1" fmla="*/ 953687 h 1723810"/>
+              <a:gd name="connsiteX2" fmla="*/ 1224364 w 2621364"/>
+              <a:gd name="connsiteY2" fmla="*/ 1701800 h 1723810"/>
+              <a:gd name="connsiteX3" fmla="*/ 2621364 w 2621364"/>
+              <a:gd name="connsiteY3" fmla="*/ 0 h 1723810"/>
+              <a:gd name="connsiteX0" fmla="*/ 358169 w 2625249"/>
+              <a:gd name="connsiteY0" fmla="*/ 845108 h 1723434"/>
+              <a:gd name="connsiteX1" fmla="*/ 30720 w 2625249"/>
+              <a:gd name="connsiteY1" fmla="*/ 953687 h 1723434"/>
+              <a:gd name="connsiteX2" fmla="*/ 1228249 w 2625249"/>
+              <a:gd name="connsiteY2" fmla="*/ 1701800 h 1723434"/>
+              <a:gd name="connsiteX3" fmla="*/ 2625249 w 2625249"/>
+              <a:gd name="connsiteY3" fmla="*/ 0 h 1723434"/>
+              <a:gd name="connsiteX0" fmla="*/ 294385 w 2634674"/>
+              <a:gd name="connsiteY0" fmla="*/ 668355 h 1724155"/>
+              <a:gd name="connsiteX1" fmla="*/ 40145 w 2634674"/>
+              <a:gd name="connsiteY1" fmla="*/ 953687 h 1724155"/>
+              <a:gd name="connsiteX2" fmla="*/ 1237674 w 2634674"/>
+              <a:gd name="connsiteY2" fmla="*/ 1701800 h 1724155"/>
+              <a:gd name="connsiteX3" fmla="*/ 2634674 w 2634674"/>
+              <a:gd name="connsiteY3" fmla="*/ 0 h 1724155"/>
+              <a:gd name="connsiteX0" fmla="*/ 50060 w 2756397"/>
+              <a:gd name="connsiteY0" fmla="*/ 772327 h 1723725"/>
+              <a:gd name="connsiteX1" fmla="*/ 161868 w 2756397"/>
+              <a:gd name="connsiteY1" fmla="*/ 953687 h 1723725"/>
+              <a:gd name="connsiteX2" fmla="*/ 1359397 w 2756397"/>
+              <a:gd name="connsiteY2" fmla="*/ 1701800 h 1723725"/>
+              <a:gd name="connsiteX3" fmla="*/ 2756397 w 2756397"/>
+              <a:gd name="connsiteY3" fmla="*/ 0 h 1723725"/>
+              <a:gd name="connsiteX0" fmla="*/ 0 w 2594529"/>
+              <a:gd name="connsiteY0" fmla="*/ 953687 h 1723725"/>
+              <a:gd name="connsiteX1" fmla="*/ 1197529 w 2594529"/>
+              <a:gd name="connsiteY1" fmla="*/ 1701800 h 1723725"/>
+              <a:gd name="connsiteX2" fmla="*/ 2594529 w 2594529"/>
+              <a:gd name="connsiteY2" fmla="*/ 0 h 1723725"/>
+            </a:gdLst>
+            <a:ahLst/>
+            <a:cxnLst>
+              <a:cxn ang="0">
+                <a:pos x="connsiteX0" y="connsiteY0"/>
+              </a:cxn>
+              <a:cxn ang="0">
+                <a:pos x="connsiteX1" y="connsiteY1"/>
+              </a:cxn>
+              <a:cxn ang="0">
+                <a:pos x="connsiteX2" y="connsiteY2"/>
+              </a:cxn>
+            </a:cxnLst>
+            <a:rect l="l" t="t" r="r" b="b"/>
+            <a:pathLst>
+              <a:path w="2594529" h="1723725">
+                <a:moveTo>
+                  <a:pt x="0" y="953687"/>
+                </a:moveTo>
+                <a:cubicBezTo>
+                  <a:pt x="218223" y="1108599"/>
+                  <a:pt x="765108" y="1860748"/>
+                  <a:pt x="1197529" y="1701800"/>
+                </a:cubicBezTo>
+                <a:cubicBezTo>
+                  <a:pt x="1629951" y="1542852"/>
+                  <a:pt x="2093937" y="775758"/>
+                  <a:pt x="2594529" y="0"/>
+                </a:cubicBezTo>
+              </a:path>
+            </a:pathLst>
+          </a:custGeom>
+          <a:ln w="889000">
+            <a:solidFill>
+              <a:srgbClr val="008000"/>
+            </a:solidFill>
+          </a:ln>
+        </p:spPr>
+        <p:style>
+          <a:lnRef idx="2">
+            <a:schemeClr val="accent1"/>
+          </a:lnRef>
+          <a:fillRef idx="0">
+            <a:schemeClr val="accent1"/>
+          </a:fillRef>
+          <a:effectRef idx="1">
+            <a:schemeClr val="accent1"/>
+          </a:effectRef>
+          <a:fontRef idx="minor">
+            <a:schemeClr val="tx1"/>
+          </a:fontRef>
+        </p:style>
+        <p:txBody>
+          <a:bodyPr rtlCol="0" anchor="ctr"/>
+          <a:lstStyle/>
+          <a:p>
+            <a:pPr algn="ctr"/>
+            <a:endParaRPr lang="en-US"/>
+          </a:p>
+        </p:txBody>
+      </p:sp>
+    </p:spTree>
+    <p:extLst>
+      <p:ext uri="{BB962C8B-B14F-4D97-AF65-F5344CB8AC3E}">
+        <p14:creationId xmlns:p14="http://schemas.microsoft.com/office/powerpoint/2010/main" val="2254998373"/>
       </p:ext>
     </p:extLst>
   </p:cSld>

</xml_diff>

<commit_message>
Added "graticule" button to main window and removed it from marble text field.  This is a toggle for displaying coordinates in lon/lat instead of meters.
</commit_message>
<xml_diff>
--- a/dert/doc/Icons.pptx
+++ b/dert/doc/Icons.pptx
@@ -334,7 +334,7 @@
           <a:p>
             <a:fld id="{E988B1C8-4186-F54F-A582-F7FEE240AB22}" type="datetimeFigureOut">
               <a:rPr lang="en-US" smtClean="0"/>
-              <a:t>3/29/16</a:t>
+              <a:t>5/22/16</a:t>
             </a:fld>
             <a:endParaRPr lang="en-US"/>
           </a:p>
@@ -504,7 +504,7 @@
           <a:p>
             <a:fld id="{E988B1C8-4186-F54F-A582-F7FEE240AB22}" type="datetimeFigureOut">
               <a:rPr lang="en-US" smtClean="0"/>
-              <a:t>3/29/16</a:t>
+              <a:t>5/22/16</a:t>
             </a:fld>
             <a:endParaRPr lang="en-US"/>
           </a:p>
@@ -684,7 +684,7 @@
           <a:p>
             <a:fld id="{E988B1C8-4186-F54F-A582-F7FEE240AB22}" type="datetimeFigureOut">
               <a:rPr lang="en-US" smtClean="0"/>
-              <a:t>3/29/16</a:t>
+              <a:t>5/22/16</a:t>
             </a:fld>
             <a:endParaRPr lang="en-US"/>
           </a:p>
@@ -854,7 +854,7 @@
           <a:p>
             <a:fld id="{E988B1C8-4186-F54F-A582-F7FEE240AB22}" type="datetimeFigureOut">
               <a:rPr lang="en-US" smtClean="0"/>
-              <a:t>3/29/16</a:t>
+              <a:t>5/22/16</a:t>
             </a:fld>
             <a:endParaRPr lang="en-US"/>
           </a:p>
@@ -1100,7 +1100,7 @@
           <a:p>
             <a:fld id="{E988B1C8-4186-F54F-A582-F7FEE240AB22}" type="datetimeFigureOut">
               <a:rPr lang="en-US" smtClean="0"/>
-              <a:t>3/29/16</a:t>
+              <a:t>5/22/16</a:t>
             </a:fld>
             <a:endParaRPr lang="en-US"/>
           </a:p>
@@ -1388,7 +1388,7 @@
           <a:p>
             <a:fld id="{E988B1C8-4186-F54F-A582-F7FEE240AB22}" type="datetimeFigureOut">
               <a:rPr lang="en-US" smtClean="0"/>
-              <a:t>3/29/16</a:t>
+              <a:t>5/22/16</a:t>
             </a:fld>
             <a:endParaRPr lang="en-US"/>
           </a:p>
@@ -1810,7 +1810,7 @@
           <a:p>
             <a:fld id="{E988B1C8-4186-F54F-A582-F7FEE240AB22}" type="datetimeFigureOut">
               <a:rPr lang="en-US" smtClean="0"/>
-              <a:t>3/29/16</a:t>
+              <a:t>5/22/16</a:t>
             </a:fld>
             <a:endParaRPr lang="en-US"/>
           </a:p>
@@ -1928,7 +1928,7 @@
           <a:p>
             <a:fld id="{E988B1C8-4186-F54F-A582-F7FEE240AB22}" type="datetimeFigureOut">
               <a:rPr lang="en-US" smtClean="0"/>
-              <a:t>3/29/16</a:t>
+              <a:t>5/22/16</a:t>
             </a:fld>
             <a:endParaRPr lang="en-US"/>
           </a:p>
@@ -2023,7 +2023,7 @@
           <a:p>
             <a:fld id="{E988B1C8-4186-F54F-A582-F7FEE240AB22}" type="datetimeFigureOut">
               <a:rPr lang="en-US" smtClean="0"/>
-              <a:t>3/29/16</a:t>
+              <a:t>5/22/16</a:t>
             </a:fld>
             <a:endParaRPr lang="en-US"/>
           </a:p>
@@ -2300,7 +2300,7 @@
           <a:p>
             <a:fld id="{E988B1C8-4186-F54F-A582-F7FEE240AB22}" type="datetimeFigureOut">
               <a:rPr lang="en-US" smtClean="0"/>
-              <a:t>3/29/16</a:t>
+              <a:t>5/22/16</a:t>
             </a:fld>
             <a:endParaRPr lang="en-US"/>
           </a:p>
@@ -2553,7 +2553,7 @@
           <a:p>
             <a:fld id="{E988B1C8-4186-F54F-A582-F7FEE240AB22}" type="datetimeFigureOut">
               <a:rPr lang="en-US" smtClean="0"/>
-              <a:t>3/29/16</a:t>
+              <a:t>5/22/16</a:t>
             </a:fld>
             <a:endParaRPr lang="en-US"/>
           </a:p>
@@ -2766,7 +2766,7 @@
           <a:p>
             <a:fld id="{E988B1C8-4186-F54F-A582-F7FEE240AB22}" type="datetimeFigureOut">
               <a:rPr lang="en-US" smtClean="0"/>
-              <a:t>3/29/16</a:t>
+              <a:t>5/22/16</a:t>
             </a:fld>
             <a:endParaRPr lang="en-US"/>
           </a:p>
@@ -6718,6 +6718,46 @@
           </a:fontRef>
         </p:style>
       </p:cxnSp>
+      <p:sp>
+        <p:nvSpPr>
+          <p:cNvPr id="2" name="Rectangle 1"/>
+          <p:cNvSpPr/>
+          <p:nvPr/>
+        </p:nvSpPr>
+        <p:spPr>
+          <a:xfrm>
+            <a:off x="1159934" y="592668"/>
+            <a:ext cx="7027334" cy="5681132"/>
+          </a:xfrm>
+          <a:prstGeom prst="rect">
+            <a:avLst/>
+          </a:prstGeom>
+          <a:noFill/>
+          <a:effectLst/>
+        </p:spPr>
+        <p:style>
+          <a:lnRef idx="1">
+            <a:schemeClr val="accent1"/>
+          </a:lnRef>
+          <a:fillRef idx="3">
+            <a:schemeClr val="accent1"/>
+          </a:fillRef>
+          <a:effectRef idx="2">
+            <a:schemeClr val="accent1"/>
+          </a:effectRef>
+          <a:fontRef idx="minor">
+            <a:schemeClr val="lt1"/>
+          </a:fontRef>
+        </p:style>
+        <p:txBody>
+          <a:bodyPr rtlCol="0" anchor="ctr"/>
+          <a:lstStyle/>
+          <a:p>
+            <a:pPr algn="ctr"/>
+            <a:endParaRPr lang="en-US"/>
+          </a:p>
+        </p:txBody>
+      </p:sp>
     </p:spTree>
     <p:extLst>
       <p:ext uri="{BB962C8B-B14F-4D97-AF65-F5344CB8AC3E}">
@@ -6848,24 +6888,72 @@
       </p:cxnSp>
       <p:sp>
         <p:nvSpPr>
-          <p:cNvPr id="5" name="Freeform 4"/>
+          <p:cNvPr id="7" name="Freeform 6"/>
           <p:cNvSpPr/>
           <p:nvPr/>
         </p:nvSpPr>
         <p:spPr>
           <a:xfrm>
-            <a:off x="2937934" y="1066800"/>
-            <a:ext cx="4563533" cy="4749800"/>
+            <a:off x="2959454" y="2895602"/>
+            <a:ext cx="3068813" cy="2392646"/>
           </a:xfrm>
           <a:custGeom>
             <a:avLst/>
             <a:gdLst>
-              <a:gd name="connsiteX0" fmla="*/ 0 w 4834466"/>
-              <a:gd name="connsiteY0" fmla="*/ 2463800 h 5223933"/>
-              <a:gd name="connsiteX1" fmla="*/ 1625600 w 4834466"/>
-              <a:gd name="connsiteY1" fmla="*/ 5223933 h 5223933"/>
-              <a:gd name="connsiteX2" fmla="*/ 4834466 w 4834466"/>
-              <a:gd name="connsiteY2" fmla="*/ 0 h 5223933"/>
+              <a:gd name="connsiteX0" fmla="*/ 61552 w 2487252"/>
+              <a:gd name="connsiteY0" fmla="*/ 876300 h 1720255"/>
+              <a:gd name="connsiteX1" fmla="*/ 112352 w 2487252"/>
+              <a:gd name="connsiteY1" fmla="*/ 901700 h 1720255"/>
+              <a:gd name="connsiteX2" fmla="*/ 1090252 w 2487252"/>
+              <a:gd name="connsiteY2" fmla="*/ 1701800 h 1720255"/>
+              <a:gd name="connsiteX3" fmla="*/ 2487252 w 2487252"/>
+              <a:gd name="connsiteY3" fmla="*/ 0 h 1720255"/>
+              <a:gd name="connsiteX0" fmla="*/ 223657 w 2649357"/>
+              <a:gd name="connsiteY0" fmla="*/ 876300 h 1723311"/>
+              <a:gd name="connsiteX1" fmla="*/ 54828 w 2649357"/>
+              <a:gd name="connsiteY1" fmla="*/ 953687 h 1723311"/>
+              <a:gd name="connsiteX2" fmla="*/ 1252357 w 2649357"/>
+              <a:gd name="connsiteY2" fmla="*/ 1701800 h 1723311"/>
+              <a:gd name="connsiteX3" fmla="*/ 2649357 w 2649357"/>
+              <a:gd name="connsiteY3" fmla="*/ 0 h 1723311"/>
+              <a:gd name="connsiteX0" fmla="*/ 390889 w 2621364"/>
+              <a:gd name="connsiteY0" fmla="*/ 751533 h 1723810"/>
+              <a:gd name="connsiteX1" fmla="*/ 26835 w 2621364"/>
+              <a:gd name="connsiteY1" fmla="*/ 953687 h 1723810"/>
+              <a:gd name="connsiteX2" fmla="*/ 1224364 w 2621364"/>
+              <a:gd name="connsiteY2" fmla="*/ 1701800 h 1723810"/>
+              <a:gd name="connsiteX3" fmla="*/ 2621364 w 2621364"/>
+              <a:gd name="connsiteY3" fmla="*/ 0 h 1723810"/>
+              <a:gd name="connsiteX0" fmla="*/ 358169 w 2625249"/>
+              <a:gd name="connsiteY0" fmla="*/ 845108 h 1723434"/>
+              <a:gd name="connsiteX1" fmla="*/ 30720 w 2625249"/>
+              <a:gd name="connsiteY1" fmla="*/ 953687 h 1723434"/>
+              <a:gd name="connsiteX2" fmla="*/ 1228249 w 2625249"/>
+              <a:gd name="connsiteY2" fmla="*/ 1701800 h 1723434"/>
+              <a:gd name="connsiteX3" fmla="*/ 2625249 w 2625249"/>
+              <a:gd name="connsiteY3" fmla="*/ 0 h 1723434"/>
+              <a:gd name="connsiteX0" fmla="*/ 294385 w 2634674"/>
+              <a:gd name="connsiteY0" fmla="*/ 668355 h 1724155"/>
+              <a:gd name="connsiteX1" fmla="*/ 40145 w 2634674"/>
+              <a:gd name="connsiteY1" fmla="*/ 953687 h 1724155"/>
+              <a:gd name="connsiteX2" fmla="*/ 1237674 w 2634674"/>
+              <a:gd name="connsiteY2" fmla="*/ 1701800 h 1724155"/>
+              <a:gd name="connsiteX3" fmla="*/ 2634674 w 2634674"/>
+              <a:gd name="connsiteY3" fmla="*/ 0 h 1724155"/>
+              <a:gd name="connsiteX0" fmla="*/ 50060 w 2756397"/>
+              <a:gd name="connsiteY0" fmla="*/ 772327 h 1723725"/>
+              <a:gd name="connsiteX1" fmla="*/ 161868 w 2756397"/>
+              <a:gd name="connsiteY1" fmla="*/ 953687 h 1723725"/>
+              <a:gd name="connsiteX2" fmla="*/ 1359397 w 2756397"/>
+              <a:gd name="connsiteY2" fmla="*/ 1701800 h 1723725"/>
+              <a:gd name="connsiteX3" fmla="*/ 2756397 w 2756397"/>
+              <a:gd name="connsiteY3" fmla="*/ 0 h 1723725"/>
+              <a:gd name="connsiteX0" fmla="*/ 0 w 2594529"/>
+              <a:gd name="connsiteY0" fmla="*/ 953687 h 1723725"/>
+              <a:gd name="connsiteX1" fmla="*/ 1197529 w 2594529"/>
+              <a:gd name="connsiteY1" fmla="*/ 1701800 h 1723725"/>
+              <a:gd name="connsiteX2" fmla="*/ 2594529 w 2594529"/>
+              <a:gd name="connsiteY2" fmla="*/ 0 h 1723725"/>
             </a:gdLst>
             <a:ahLst/>
             <a:cxnLst>
@@ -6881,24 +6969,29 @@
             </a:cxnLst>
             <a:rect l="l" t="t" r="r" b="b"/>
             <a:pathLst>
-              <a:path w="4834466" h="5223933">
+              <a:path w="2594529" h="1723725">
                 <a:moveTo>
-                  <a:pt x="0" y="2463800"/>
+                  <a:pt x="0" y="953687"/>
                 </a:moveTo>
-                <a:lnTo>
-                  <a:pt x="1625600" y="5223933"/>
-                </a:lnTo>
-                <a:lnTo>
-                  <a:pt x="4834466" y="0"/>
-                </a:lnTo>
+                <a:cubicBezTo>
+                  <a:pt x="218223" y="1108599"/>
+                  <a:pt x="765108" y="1860748"/>
+                  <a:pt x="1197529" y="1701800"/>
+                </a:cubicBezTo>
+                <a:cubicBezTo>
+                  <a:pt x="1629951" y="1542852"/>
+                  <a:pt x="2093937" y="775758"/>
+                  <a:pt x="2594529" y="0"/>
+                </a:cubicBezTo>
               </a:path>
             </a:pathLst>
           </a:custGeom>
-          <a:ln w="508000">
+          <a:ln w="889000">
             <a:solidFill>
               <a:srgbClr val="008000"/>
             </a:solidFill>
           </a:ln>
+          <a:effectLst/>
         </p:spPr>
         <p:style>
           <a:lnRef idx="2">
@@ -6912,6 +7005,46 @@
           </a:effectRef>
           <a:fontRef idx="minor">
             <a:schemeClr val="tx1"/>
+          </a:fontRef>
+        </p:style>
+        <p:txBody>
+          <a:bodyPr rtlCol="0" anchor="ctr"/>
+          <a:lstStyle/>
+          <a:p>
+            <a:pPr algn="ctr"/>
+            <a:endParaRPr lang="en-US"/>
+          </a:p>
+        </p:txBody>
+      </p:sp>
+      <p:sp>
+        <p:nvSpPr>
+          <p:cNvPr id="5" name="Rectangle 4"/>
+          <p:cNvSpPr/>
+          <p:nvPr/>
+        </p:nvSpPr>
+        <p:spPr>
+          <a:xfrm>
+            <a:off x="1159934" y="592668"/>
+            <a:ext cx="7027334" cy="5681132"/>
+          </a:xfrm>
+          <a:prstGeom prst="rect">
+            <a:avLst/>
+          </a:prstGeom>
+          <a:noFill/>
+          <a:effectLst/>
+        </p:spPr>
+        <p:style>
+          <a:lnRef idx="1">
+            <a:schemeClr val="accent1"/>
+          </a:lnRef>
+          <a:fillRef idx="3">
+            <a:schemeClr val="accent1"/>
+          </a:fillRef>
+          <a:effectRef idx="2">
+            <a:schemeClr val="accent1"/>
+          </a:effectRef>
+          <a:fontRef idx="minor">
+            <a:schemeClr val="lt1"/>
           </a:fontRef>
         </p:style>
         <p:txBody>
@@ -6955,24 +7088,72 @@
       </p:grpSpPr>
       <p:sp>
         <p:nvSpPr>
-          <p:cNvPr id="5" name="Freeform 4"/>
+          <p:cNvPr id="3" name="Freeform 2"/>
           <p:cNvSpPr/>
           <p:nvPr/>
         </p:nvSpPr>
         <p:spPr>
           <a:xfrm>
-            <a:off x="2252134" y="1054100"/>
-            <a:ext cx="4563533" cy="4749800"/>
+            <a:off x="2764721" y="2091268"/>
+            <a:ext cx="3068813" cy="2392646"/>
           </a:xfrm>
           <a:custGeom>
             <a:avLst/>
             <a:gdLst>
-              <a:gd name="connsiteX0" fmla="*/ 0 w 4834466"/>
-              <a:gd name="connsiteY0" fmla="*/ 2463800 h 5223933"/>
-              <a:gd name="connsiteX1" fmla="*/ 1625600 w 4834466"/>
-              <a:gd name="connsiteY1" fmla="*/ 5223933 h 5223933"/>
-              <a:gd name="connsiteX2" fmla="*/ 4834466 w 4834466"/>
-              <a:gd name="connsiteY2" fmla="*/ 0 h 5223933"/>
+              <a:gd name="connsiteX0" fmla="*/ 61552 w 2487252"/>
+              <a:gd name="connsiteY0" fmla="*/ 876300 h 1720255"/>
+              <a:gd name="connsiteX1" fmla="*/ 112352 w 2487252"/>
+              <a:gd name="connsiteY1" fmla="*/ 901700 h 1720255"/>
+              <a:gd name="connsiteX2" fmla="*/ 1090252 w 2487252"/>
+              <a:gd name="connsiteY2" fmla="*/ 1701800 h 1720255"/>
+              <a:gd name="connsiteX3" fmla="*/ 2487252 w 2487252"/>
+              <a:gd name="connsiteY3" fmla="*/ 0 h 1720255"/>
+              <a:gd name="connsiteX0" fmla="*/ 223657 w 2649357"/>
+              <a:gd name="connsiteY0" fmla="*/ 876300 h 1723311"/>
+              <a:gd name="connsiteX1" fmla="*/ 54828 w 2649357"/>
+              <a:gd name="connsiteY1" fmla="*/ 953687 h 1723311"/>
+              <a:gd name="connsiteX2" fmla="*/ 1252357 w 2649357"/>
+              <a:gd name="connsiteY2" fmla="*/ 1701800 h 1723311"/>
+              <a:gd name="connsiteX3" fmla="*/ 2649357 w 2649357"/>
+              <a:gd name="connsiteY3" fmla="*/ 0 h 1723311"/>
+              <a:gd name="connsiteX0" fmla="*/ 390889 w 2621364"/>
+              <a:gd name="connsiteY0" fmla="*/ 751533 h 1723810"/>
+              <a:gd name="connsiteX1" fmla="*/ 26835 w 2621364"/>
+              <a:gd name="connsiteY1" fmla="*/ 953687 h 1723810"/>
+              <a:gd name="connsiteX2" fmla="*/ 1224364 w 2621364"/>
+              <a:gd name="connsiteY2" fmla="*/ 1701800 h 1723810"/>
+              <a:gd name="connsiteX3" fmla="*/ 2621364 w 2621364"/>
+              <a:gd name="connsiteY3" fmla="*/ 0 h 1723810"/>
+              <a:gd name="connsiteX0" fmla="*/ 358169 w 2625249"/>
+              <a:gd name="connsiteY0" fmla="*/ 845108 h 1723434"/>
+              <a:gd name="connsiteX1" fmla="*/ 30720 w 2625249"/>
+              <a:gd name="connsiteY1" fmla="*/ 953687 h 1723434"/>
+              <a:gd name="connsiteX2" fmla="*/ 1228249 w 2625249"/>
+              <a:gd name="connsiteY2" fmla="*/ 1701800 h 1723434"/>
+              <a:gd name="connsiteX3" fmla="*/ 2625249 w 2625249"/>
+              <a:gd name="connsiteY3" fmla="*/ 0 h 1723434"/>
+              <a:gd name="connsiteX0" fmla="*/ 294385 w 2634674"/>
+              <a:gd name="connsiteY0" fmla="*/ 668355 h 1724155"/>
+              <a:gd name="connsiteX1" fmla="*/ 40145 w 2634674"/>
+              <a:gd name="connsiteY1" fmla="*/ 953687 h 1724155"/>
+              <a:gd name="connsiteX2" fmla="*/ 1237674 w 2634674"/>
+              <a:gd name="connsiteY2" fmla="*/ 1701800 h 1724155"/>
+              <a:gd name="connsiteX3" fmla="*/ 2634674 w 2634674"/>
+              <a:gd name="connsiteY3" fmla="*/ 0 h 1724155"/>
+              <a:gd name="connsiteX0" fmla="*/ 50060 w 2756397"/>
+              <a:gd name="connsiteY0" fmla="*/ 772327 h 1723725"/>
+              <a:gd name="connsiteX1" fmla="*/ 161868 w 2756397"/>
+              <a:gd name="connsiteY1" fmla="*/ 953687 h 1723725"/>
+              <a:gd name="connsiteX2" fmla="*/ 1359397 w 2756397"/>
+              <a:gd name="connsiteY2" fmla="*/ 1701800 h 1723725"/>
+              <a:gd name="connsiteX3" fmla="*/ 2756397 w 2756397"/>
+              <a:gd name="connsiteY3" fmla="*/ 0 h 1723725"/>
+              <a:gd name="connsiteX0" fmla="*/ 0 w 2594529"/>
+              <a:gd name="connsiteY0" fmla="*/ 953687 h 1723725"/>
+              <a:gd name="connsiteX1" fmla="*/ 1197529 w 2594529"/>
+              <a:gd name="connsiteY1" fmla="*/ 1701800 h 1723725"/>
+              <a:gd name="connsiteX2" fmla="*/ 2594529 w 2594529"/>
+              <a:gd name="connsiteY2" fmla="*/ 0 h 1723725"/>
             </a:gdLst>
             <a:ahLst/>
             <a:cxnLst>
@@ -6988,24 +7169,29 @@
             </a:cxnLst>
             <a:rect l="l" t="t" r="r" b="b"/>
             <a:pathLst>
-              <a:path w="4834466" h="5223933">
+              <a:path w="2594529" h="1723725">
                 <a:moveTo>
-                  <a:pt x="0" y="2463800"/>
+                  <a:pt x="0" y="953687"/>
                 </a:moveTo>
-                <a:lnTo>
-                  <a:pt x="1625600" y="5223933"/>
-                </a:lnTo>
-                <a:lnTo>
-                  <a:pt x="4834466" y="0"/>
-                </a:lnTo>
+                <a:cubicBezTo>
+                  <a:pt x="218223" y="1108599"/>
+                  <a:pt x="765108" y="1860748"/>
+                  <a:pt x="1197529" y="1701800"/>
+                </a:cubicBezTo>
+                <a:cubicBezTo>
+                  <a:pt x="1629951" y="1542852"/>
+                  <a:pt x="2093937" y="775758"/>
+                  <a:pt x="2594529" y="0"/>
+                </a:cubicBezTo>
               </a:path>
             </a:pathLst>
           </a:custGeom>
-          <a:ln w="508000">
+          <a:ln w="889000">
             <a:solidFill>
               <a:srgbClr val="008000"/>
             </a:solidFill>
           </a:ln>
+          <a:effectLst/>
         </p:spPr>
         <p:style>
           <a:lnRef idx="2">
@@ -8201,6 +8387,46 @@
           </a:p>
         </p:txBody>
       </p:sp>
+      <p:sp>
+        <p:nvSpPr>
+          <p:cNvPr id="11" name="Rectangle 10"/>
+          <p:cNvSpPr/>
+          <p:nvPr/>
+        </p:nvSpPr>
+        <p:spPr>
+          <a:xfrm>
+            <a:off x="965200" y="397934"/>
+            <a:ext cx="7222068" cy="5816600"/>
+          </a:xfrm>
+          <a:prstGeom prst="rect">
+            <a:avLst/>
+          </a:prstGeom>
+          <a:noFill/>
+          <a:effectLst/>
+        </p:spPr>
+        <p:style>
+          <a:lnRef idx="1">
+            <a:schemeClr val="accent1"/>
+          </a:lnRef>
+          <a:fillRef idx="3">
+            <a:schemeClr val="accent1"/>
+          </a:fillRef>
+          <a:effectRef idx="2">
+            <a:schemeClr val="accent1"/>
+          </a:effectRef>
+          <a:fontRef idx="minor">
+            <a:schemeClr val="lt1"/>
+          </a:fontRef>
+        </p:style>
+        <p:txBody>
+          <a:bodyPr rtlCol="0" anchor="ctr"/>
+          <a:lstStyle/>
+          <a:p>
+            <a:pPr algn="ctr"/>
+            <a:endParaRPr lang="en-US"/>
+          </a:p>
+        </p:txBody>
+      </p:sp>
     </p:spTree>
     <p:extLst>
       <p:ext uri="{BB962C8B-B14F-4D97-AF65-F5344CB8AC3E}">
@@ -8568,24 +8794,72 @@
       </p:sp>
       <p:sp>
         <p:nvSpPr>
-          <p:cNvPr id="5" name="Freeform 4"/>
+          <p:cNvPr id="11" name="Freeform 10"/>
           <p:cNvSpPr/>
           <p:nvPr/>
         </p:nvSpPr>
         <p:spPr>
           <a:xfrm>
-            <a:off x="3158067" y="1016000"/>
-            <a:ext cx="4563533" cy="4800600"/>
+            <a:off x="1901122" y="2751667"/>
+            <a:ext cx="3068813" cy="2392646"/>
           </a:xfrm>
           <a:custGeom>
             <a:avLst/>
             <a:gdLst>
-              <a:gd name="connsiteX0" fmla="*/ 0 w 4834466"/>
-              <a:gd name="connsiteY0" fmla="*/ 2463800 h 5223933"/>
-              <a:gd name="connsiteX1" fmla="*/ 1625600 w 4834466"/>
-              <a:gd name="connsiteY1" fmla="*/ 5223933 h 5223933"/>
-              <a:gd name="connsiteX2" fmla="*/ 4834466 w 4834466"/>
-              <a:gd name="connsiteY2" fmla="*/ 0 h 5223933"/>
+              <a:gd name="connsiteX0" fmla="*/ 61552 w 2487252"/>
+              <a:gd name="connsiteY0" fmla="*/ 876300 h 1720255"/>
+              <a:gd name="connsiteX1" fmla="*/ 112352 w 2487252"/>
+              <a:gd name="connsiteY1" fmla="*/ 901700 h 1720255"/>
+              <a:gd name="connsiteX2" fmla="*/ 1090252 w 2487252"/>
+              <a:gd name="connsiteY2" fmla="*/ 1701800 h 1720255"/>
+              <a:gd name="connsiteX3" fmla="*/ 2487252 w 2487252"/>
+              <a:gd name="connsiteY3" fmla="*/ 0 h 1720255"/>
+              <a:gd name="connsiteX0" fmla="*/ 223657 w 2649357"/>
+              <a:gd name="connsiteY0" fmla="*/ 876300 h 1723311"/>
+              <a:gd name="connsiteX1" fmla="*/ 54828 w 2649357"/>
+              <a:gd name="connsiteY1" fmla="*/ 953687 h 1723311"/>
+              <a:gd name="connsiteX2" fmla="*/ 1252357 w 2649357"/>
+              <a:gd name="connsiteY2" fmla="*/ 1701800 h 1723311"/>
+              <a:gd name="connsiteX3" fmla="*/ 2649357 w 2649357"/>
+              <a:gd name="connsiteY3" fmla="*/ 0 h 1723311"/>
+              <a:gd name="connsiteX0" fmla="*/ 390889 w 2621364"/>
+              <a:gd name="connsiteY0" fmla="*/ 751533 h 1723810"/>
+              <a:gd name="connsiteX1" fmla="*/ 26835 w 2621364"/>
+              <a:gd name="connsiteY1" fmla="*/ 953687 h 1723810"/>
+              <a:gd name="connsiteX2" fmla="*/ 1224364 w 2621364"/>
+              <a:gd name="connsiteY2" fmla="*/ 1701800 h 1723810"/>
+              <a:gd name="connsiteX3" fmla="*/ 2621364 w 2621364"/>
+              <a:gd name="connsiteY3" fmla="*/ 0 h 1723810"/>
+              <a:gd name="connsiteX0" fmla="*/ 358169 w 2625249"/>
+              <a:gd name="connsiteY0" fmla="*/ 845108 h 1723434"/>
+              <a:gd name="connsiteX1" fmla="*/ 30720 w 2625249"/>
+              <a:gd name="connsiteY1" fmla="*/ 953687 h 1723434"/>
+              <a:gd name="connsiteX2" fmla="*/ 1228249 w 2625249"/>
+              <a:gd name="connsiteY2" fmla="*/ 1701800 h 1723434"/>
+              <a:gd name="connsiteX3" fmla="*/ 2625249 w 2625249"/>
+              <a:gd name="connsiteY3" fmla="*/ 0 h 1723434"/>
+              <a:gd name="connsiteX0" fmla="*/ 294385 w 2634674"/>
+              <a:gd name="connsiteY0" fmla="*/ 668355 h 1724155"/>
+              <a:gd name="connsiteX1" fmla="*/ 40145 w 2634674"/>
+              <a:gd name="connsiteY1" fmla="*/ 953687 h 1724155"/>
+              <a:gd name="connsiteX2" fmla="*/ 1237674 w 2634674"/>
+              <a:gd name="connsiteY2" fmla="*/ 1701800 h 1724155"/>
+              <a:gd name="connsiteX3" fmla="*/ 2634674 w 2634674"/>
+              <a:gd name="connsiteY3" fmla="*/ 0 h 1724155"/>
+              <a:gd name="connsiteX0" fmla="*/ 50060 w 2756397"/>
+              <a:gd name="connsiteY0" fmla="*/ 772327 h 1723725"/>
+              <a:gd name="connsiteX1" fmla="*/ 161868 w 2756397"/>
+              <a:gd name="connsiteY1" fmla="*/ 953687 h 1723725"/>
+              <a:gd name="connsiteX2" fmla="*/ 1359397 w 2756397"/>
+              <a:gd name="connsiteY2" fmla="*/ 1701800 h 1723725"/>
+              <a:gd name="connsiteX3" fmla="*/ 2756397 w 2756397"/>
+              <a:gd name="connsiteY3" fmla="*/ 0 h 1723725"/>
+              <a:gd name="connsiteX0" fmla="*/ 0 w 2594529"/>
+              <a:gd name="connsiteY0" fmla="*/ 953687 h 1723725"/>
+              <a:gd name="connsiteX1" fmla="*/ 1197529 w 2594529"/>
+              <a:gd name="connsiteY1" fmla="*/ 1701800 h 1723725"/>
+              <a:gd name="connsiteX2" fmla="*/ 2594529 w 2594529"/>
+              <a:gd name="connsiteY2" fmla="*/ 0 h 1723725"/>
             </a:gdLst>
             <a:ahLst/>
             <a:cxnLst>
@@ -8601,24 +8875,29 @@
             </a:cxnLst>
             <a:rect l="l" t="t" r="r" b="b"/>
             <a:pathLst>
-              <a:path w="4834466" h="5223933">
+              <a:path w="2594529" h="1723725">
                 <a:moveTo>
-                  <a:pt x="0" y="2463800"/>
+                  <a:pt x="0" y="953687"/>
                 </a:moveTo>
-                <a:lnTo>
-                  <a:pt x="1625600" y="5223933"/>
-                </a:lnTo>
-                <a:lnTo>
-                  <a:pt x="4834466" y="0"/>
-                </a:lnTo>
+                <a:cubicBezTo>
+                  <a:pt x="218223" y="1108599"/>
+                  <a:pt x="765108" y="1860748"/>
+                  <a:pt x="1197529" y="1701800"/>
+                </a:cubicBezTo>
+                <a:cubicBezTo>
+                  <a:pt x="1629951" y="1542852"/>
+                  <a:pt x="2093937" y="775758"/>
+                  <a:pt x="2594529" y="0"/>
+                </a:cubicBezTo>
               </a:path>
             </a:pathLst>
           </a:custGeom>
-          <a:ln w="508000">
+          <a:ln w="889000">
             <a:solidFill>
               <a:srgbClr val="008000"/>
             </a:solidFill>
           </a:ln>
+          <a:effectLst/>
         </p:spPr>
         <p:style>
           <a:lnRef idx="2">
@@ -8632,6 +8911,46 @@
           </a:effectRef>
           <a:fontRef idx="minor">
             <a:schemeClr val="tx1"/>
+          </a:fontRef>
+        </p:style>
+        <p:txBody>
+          <a:bodyPr rtlCol="0" anchor="ctr"/>
+          <a:lstStyle/>
+          <a:p>
+            <a:pPr algn="ctr"/>
+            <a:endParaRPr lang="en-US"/>
+          </a:p>
+        </p:txBody>
+      </p:sp>
+      <p:sp>
+        <p:nvSpPr>
+          <p:cNvPr id="16" name="Rectangle 15"/>
+          <p:cNvSpPr/>
+          <p:nvPr/>
+        </p:nvSpPr>
+        <p:spPr>
+          <a:xfrm>
+            <a:off x="965200" y="397934"/>
+            <a:ext cx="7222068" cy="5816600"/>
+          </a:xfrm>
+          <a:prstGeom prst="rect">
+            <a:avLst/>
+          </a:prstGeom>
+          <a:noFill/>
+          <a:effectLst/>
+        </p:spPr>
+        <p:style>
+          <a:lnRef idx="1">
+            <a:schemeClr val="accent1"/>
+          </a:lnRef>
+          <a:fillRef idx="3">
+            <a:schemeClr val="accent1"/>
+          </a:fillRef>
+          <a:effectRef idx="2">
+            <a:schemeClr val="accent1"/>
+          </a:effectRef>
+          <a:fontRef idx="minor">
+            <a:schemeClr val="lt1"/>
           </a:fontRef>
         </p:style>
         <p:txBody>
@@ -13745,6 +14064,46 @@
           </a:fontRef>
         </p:style>
       </p:cxnSp>
+      <p:sp>
+        <p:nvSpPr>
+          <p:cNvPr id="3" name="Rectangle 2"/>
+          <p:cNvSpPr/>
+          <p:nvPr/>
+        </p:nvSpPr>
+        <p:spPr>
+          <a:xfrm>
+            <a:off x="1896533" y="829733"/>
+            <a:ext cx="5198534" cy="5080000"/>
+          </a:xfrm>
+          <a:prstGeom prst="rect">
+            <a:avLst/>
+          </a:prstGeom>
+          <a:noFill/>
+          <a:effectLst/>
+        </p:spPr>
+        <p:style>
+          <a:lnRef idx="1">
+            <a:schemeClr val="accent1"/>
+          </a:lnRef>
+          <a:fillRef idx="3">
+            <a:schemeClr val="accent1"/>
+          </a:fillRef>
+          <a:effectRef idx="2">
+            <a:schemeClr val="accent1"/>
+          </a:effectRef>
+          <a:fontRef idx="minor">
+            <a:schemeClr val="lt1"/>
+          </a:fontRef>
+        </p:style>
+        <p:txBody>
+          <a:bodyPr rtlCol="0" anchor="ctr"/>
+          <a:lstStyle/>
+          <a:p>
+            <a:pPr algn="ctr"/>
+            <a:endParaRPr lang="en-US"/>
+          </a:p>
+        </p:txBody>
+      </p:sp>
     </p:spTree>
     <p:extLst>
       <p:ext uri="{BB962C8B-B14F-4D97-AF65-F5344CB8AC3E}">
@@ -14390,6 +14749,7 @@
               <a:srgbClr val="008000"/>
             </a:solidFill>
           </a:ln>
+          <a:effectLst/>
         </p:spPr>
         <p:style>
           <a:lnRef idx="2">
@@ -14403,6 +14763,46 @@
           </a:effectRef>
           <a:fontRef idx="minor">
             <a:schemeClr val="tx1"/>
+          </a:fontRef>
+        </p:style>
+        <p:txBody>
+          <a:bodyPr rtlCol="0" anchor="ctr"/>
+          <a:lstStyle/>
+          <a:p>
+            <a:pPr algn="ctr"/>
+            <a:endParaRPr lang="en-US"/>
+          </a:p>
+        </p:txBody>
+      </p:sp>
+      <p:sp>
+        <p:nvSpPr>
+          <p:cNvPr id="17" name="Rectangle 16"/>
+          <p:cNvSpPr/>
+          <p:nvPr/>
+        </p:nvSpPr>
+        <p:spPr>
+          <a:xfrm>
+            <a:off x="1896533" y="829733"/>
+            <a:ext cx="5198534" cy="5080000"/>
+          </a:xfrm>
+          <a:prstGeom prst="rect">
+            <a:avLst/>
+          </a:prstGeom>
+          <a:noFill/>
+          <a:effectLst/>
+        </p:spPr>
+        <p:style>
+          <a:lnRef idx="1">
+            <a:schemeClr val="accent1"/>
+          </a:lnRef>
+          <a:fillRef idx="3">
+            <a:schemeClr val="accent1"/>
+          </a:fillRef>
+          <a:effectRef idx="2">
+            <a:schemeClr val="accent1"/>
+          </a:effectRef>
+          <a:fontRef idx="minor">
+            <a:schemeClr val="lt1"/>
           </a:fontRef>
         </p:style>
         <p:txBody>

</xml_diff>

<commit_message>
Added scale bar icon and updated user guide.
</commit_message>
<xml_diff>
--- a/dert/doc/Icons.pptx
+++ b/dert/doc/Icons.pptx
@@ -52,6 +52,7 @@
     <p:sldId id="302" r:id="rId46"/>
     <p:sldId id="306" r:id="rId47"/>
     <p:sldId id="307" r:id="rId48"/>
+    <p:sldId id="308" r:id="rId49"/>
   </p:sldIdLst>
   <p:sldSz cx="9144000" cy="6858000" type="screen4x3"/>
   <p:notesSz cx="6858000" cy="9144000"/>
@@ -334,7 +335,7 @@
           <a:p>
             <a:fld id="{E988B1C8-4186-F54F-A582-F7FEE240AB22}" type="datetimeFigureOut">
               <a:rPr lang="en-US" smtClean="0"/>
-              <a:t>5/22/16</a:t>
+              <a:t>7/21/16</a:t>
             </a:fld>
             <a:endParaRPr lang="en-US"/>
           </a:p>
@@ -504,7 +505,7 @@
           <a:p>
             <a:fld id="{E988B1C8-4186-F54F-A582-F7FEE240AB22}" type="datetimeFigureOut">
               <a:rPr lang="en-US" smtClean="0"/>
-              <a:t>5/22/16</a:t>
+              <a:t>7/21/16</a:t>
             </a:fld>
             <a:endParaRPr lang="en-US"/>
           </a:p>
@@ -684,7 +685,7 @@
           <a:p>
             <a:fld id="{E988B1C8-4186-F54F-A582-F7FEE240AB22}" type="datetimeFigureOut">
               <a:rPr lang="en-US" smtClean="0"/>
-              <a:t>5/22/16</a:t>
+              <a:t>7/21/16</a:t>
             </a:fld>
             <a:endParaRPr lang="en-US"/>
           </a:p>
@@ -854,7 +855,7 @@
           <a:p>
             <a:fld id="{E988B1C8-4186-F54F-A582-F7FEE240AB22}" type="datetimeFigureOut">
               <a:rPr lang="en-US" smtClean="0"/>
-              <a:t>5/22/16</a:t>
+              <a:t>7/21/16</a:t>
             </a:fld>
             <a:endParaRPr lang="en-US"/>
           </a:p>
@@ -1100,7 +1101,7 @@
           <a:p>
             <a:fld id="{E988B1C8-4186-F54F-A582-F7FEE240AB22}" type="datetimeFigureOut">
               <a:rPr lang="en-US" smtClean="0"/>
-              <a:t>5/22/16</a:t>
+              <a:t>7/21/16</a:t>
             </a:fld>
             <a:endParaRPr lang="en-US"/>
           </a:p>
@@ -1388,7 +1389,7 @@
           <a:p>
             <a:fld id="{E988B1C8-4186-F54F-A582-F7FEE240AB22}" type="datetimeFigureOut">
               <a:rPr lang="en-US" smtClean="0"/>
-              <a:t>5/22/16</a:t>
+              <a:t>7/21/16</a:t>
             </a:fld>
             <a:endParaRPr lang="en-US"/>
           </a:p>
@@ -1810,7 +1811,7 @@
           <a:p>
             <a:fld id="{E988B1C8-4186-F54F-A582-F7FEE240AB22}" type="datetimeFigureOut">
               <a:rPr lang="en-US" smtClean="0"/>
-              <a:t>5/22/16</a:t>
+              <a:t>7/21/16</a:t>
             </a:fld>
             <a:endParaRPr lang="en-US"/>
           </a:p>
@@ -1928,7 +1929,7 @@
           <a:p>
             <a:fld id="{E988B1C8-4186-F54F-A582-F7FEE240AB22}" type="datetimeFigureOut">
               <a:rPr lang="en-US" smtClean="0"/>
-              <a:t>5/22/16</a:t>
+              <a:t>7/21/16</a:t>
             </a:fld>
             <a:endParaRPr lang="en-US"/>
           </a:p>
@@ -2023,7 +2024,7 @@
           <a:p>
             <a:fld id="{E988B1C8-4186-F54F-A582-F7FEE240AB22}" type="datetimeFigureOut">
               <a:rPr lang="en-US" smtClean="0"/>
-              <a:t>5/22/16</a:t>
+              <a:t>7/21/16</a:t>
             </a:fld>
             <a:endParaRPr lang="en-US"/>
           </a:p>
@@ -2300,7 +2301,7 @@
           <a:p>
             <a:fld id="{E988B1C8-4186-F54F-A582-F7FEE240AB22}" type="datetimeFigureOut">
               <a:rPr lang="en-US" smtClean="0"/>
-              <a:t>5/22/16</a:t>
+              <a:t>7/21/16</a:t>
             </a:fld>
             <a:endParaRPr lang="en-US"/>
           </a:p>
@@ -2553,7 +2554,7 @@
           <a:p>
             <a:fld id="{E988B1C8-4186-F54F-A582-F7FEE240AB22}" type="datetimeFigureOut">
               <a:rPr lang="en-US" smtClean="0"/>
-              <a:t>5/22/16</a:t>
+              <a:t>7/21/16</a:t>
             </a:fld>
             <a:endParaRPr lang="en-US"/>
           </a:p>
@@ -2766,7 +2767,7 @@
           <a:p>
             <a:fld id="{E988B1C8-4186-F54F-A582-F7FEE240AB22}" type="datetimeFigureOut">
               <a:rPr lang="en-US" smtClean="0"/>
-              <a:t>5/22/16</a:t>
+              <a:t>7/21/16</a:t>
             </a:fld>
             <a:endParaRPr lang="en-US"/>
           </a:p>
@@ -14818,6 +14819,204 @@
     <p:extLst>
       <p:ext uri="{BB962C8B-B14F-4D97-AF65-F5344CB8AC3E}">
         <p14:creationId xmlns:p14="http://schemas.microsoft.com/office/powerpoint/2010/main" val="2254998373"/>
+      </p:ext>
+    </p:extLst>
+  </p:cSld>
+  <p:clrMapOvr>
+    <a:masterClrMapping/>
+  </p:clrMapOvr>
+</p:sld>
+</file>
+
+<file path=ppt/slides/slide48.xml><?xml version="1.0" encoding="utf-8"?>
+<p:sld xmlns:a="http://schemas.openxmlformats.org/drawingml/2006/main" xmlns:r="http://schemas.openxmlformats.org/officeDocument/2006/relationships" xmlns:p="http://schemas.openxmlformats.org/presentationml/2006/main">
+  <p:cSld>
+    <p:spTree>
+      <p:nvGrpSpPr>
+        <p:cNvPr id="1" name=""/>
+        <p:cNvGrpSpPr/>
+        <p:nvPr/>
+      </p:nvGrpSpPr>
+      <p:grpSpPr>
+        <a:xfrm>
+          <a:off x="0" y="0"/>
+          <a:ext cx="0" cy="0"/>
+          <a:chOff x="0" y="0"/>
+          <a:chExt cx="0" cy="0"/>
+        </a:xfrm>
+      </p:grpSpPr>
+      <p:sp>
+        <p:nvSpPr>
+          <p:cNvPr id="9" name="Can 8"/>
+          <p:cNvSpPr/>
+          <p:nvPr/>
+        </p:nvSpPr>
+        <p:spPr>
+          <a:xfrm rot="16200000">
+            <a:off x="6273435" y="2184768"/>
+            <a:ext cx="1473934" cy="2048931"/>
+          </a:xfrm>
+          <a:prstGeom prst="can">
+            <a:avLst/>
+          </a:prstGeom>
+        </p:spPr>
+        <p:style>
+          <a:lnRef idx="0">
+            <a:schemeClr val="accent6"/>
+          </a:lnRef>
+          <a:fillRef idx="3">
+            <a:schemeClr val="accent6"/>
+          </a:fillRef>
+          <a:effectRef idx="3">
+            <a:schemeClr val="accent6"/>
+          </a:effectRef>
+          <a:fontRef idx="minor">
+            <a:schemeClr val="lt1"/>
+          </a:fontRef>
+        </p:style>
+        <p:txBody>
+          <a:bodyPr rtlCol="0" anchor="ctr"/>
+          <a:lstStyle/>
+          <a:p>
+            <a:pPr algn="ctr"/>
+            <a:endParaRPr lang="en-US"/>
+          </a:p>
+        </p:txBody>
+      </p:sp>
+      <p:sp>
+        <p:nvSpPr>
+          <p:cNvPr id="8" name="Can 7"/>
+          <p:cNvSpPr/>
+          <p:nvPr/>
+        </p:nvSpPr>
+        <p:spPr>
+          <a:xfrm rot="16200000">
+            <a:off x="4644621" y="2221114"/>
+            <a:ext cx="1473934" cy="2008634"/>
+          </a:xfrm>
+          <a:prstGeom prst="can">
+            <a:avLst/>
+          </a:prstGeom>
+          <a:solidFill>
+            <a:schemeClr val="tx1"/>
+          </a:solidFill>
+          <a:ln>
+            <a:solidFill>
+              <a:schemeClr val="tx1"/>
+            </a:solidFill>
+          </a:ln>
+        </p:spPr>
+        <p:style>
+          <a:lnRef idx="1">
+            <a:schemeClr val="accent1"/>
+          </a:lnRef>
+          <a:fillRef idx="3">
+            <a:schemeClr val="accent1"/>
+          </a:fillRef>
+          <a:effectRef idx="2">
+            <a:schemeClr val="accent1"/>
+          </a:effectRef>
+          <a:fontRef idx="minor">
+            <a:schemeClr val="lt1"/>
+          </a:fontRef>
+        </p:style>
+        <p:txBody>
+          <a:bodyPr rtlCol="0" anchor="ctr"/>
+          <a:lstStyle/>
+          <a:p>
+            <a:pPr algn="ctr"/>
+            <a:endParaRPr lang="en-US"/>
+          </a:p>
+        </p:txBody>
+      </p:sp>
+      <p:sp>
+        <p:nvSpPr>
+          <p:cNvPr id="7" name="Can 6"/>
+          <p:cNvSpPr/>
+          <p:nvPr/>
+        </p:nvSpPr>
+        <p:spPr>
+          <a:xfrm rot="16200000">
+            <a:off x="2984386" y="2221883"/>
+            <a:ext cx="1473934" cy="2007099"/>
+          </a:xfrm>
+          <a:prstGeom prst="can">
+            <a:avLst/>
+          </a:prstGeom>
+        </p:spPr>
+        <p:style>
+          <a:lnRef idx="1">
+            <a:schemeClr val="accent6"/>
+          </a:lnRef>
+          <a:fillRef idx="3">
+            <a:schemeClr val="accent6"/>
+          </a:fillRef>
+          <a:effectRef idx="2">
+            <a:schemeClr val="accent6"/>
+          </a:effectRef>
+          <a:fontRef idx="minor">
+            <a:schemeClr val="lt1"/>
+          </a:fontRef>
+        </p:style>
+        <p:txBody>
+          <a:bodyPr rtlCol="0" anchor="ctr"/>
+          <a:lstStyle/>
+          <a:p>
+            <a:pPr algn="ctr"/>
+            <a:endParaRPr lang="en-US"/>
+          </a:p>
+        </p:txBody>
+      </p:sp>
+      <p:sp>
+        <p:nvSpPr>
+          <p:cNvPr id="6" name="Can 5"/>
+          <p:cNvSpPr/>
+          <p:nvPr/>
+        </p:nvSpPr>
+        <p:spPr>
+          <a:xfrm rot="16200000">
+            <a:off x="1358017" y="2256514"/>
+            <a:ext cx="1473934" cy="1937833"/>
+          </a:xfrm>
+          <a:prstGeom prst="can">
+            <a:avLst/>
+          </a:prstGeom>
+          <a:solidFill>
+            <a:schemeClr val="tx1"/>
+          </a:solidFill>
+          <a:ln>
+            <a:solidFill>
+              <a:schemeClr val="tx1"/>
+            </a:solidFill>
+          </a:ln>
+        </p:spPr>
+        <p:style>
+          <a:lnRef idx="1">
+            <a:schemeClr val="accent1"/>
+          </a:lnRef>
+          <a:fillRef idx="3">
+            <a:schemeClr val="accent1"/>
+          </a:fillRef>
+          <a:effectRef idx="2">
+            <a:schemeClr val="accent1"/>
+          </a:effectRef>
+          <a:fontRef idx="minor">
+            <a:schemeClr val="lt1"/>
+          </a:fontRef>
+        </p:style>
+        <p:txBody>
+          <a:bodyPr rtlCol="0" anchor="ctr"/>
+          <a:lstStyle/>
+          <a:p>
+            <a:pPr algn="ctr"/>
+            <a:endParaRPr lang="en-US"/>
+          </a:p>
+        </p:txBody>
+      </p:sp>
+    </p:spTree>
+    <p:extLst>
+      <p:ext uri="{BB962C8B-B14F-4D97-AF65-F5344CB8AC3E}">
+        <p14:creationId xmlns:p14="http://schemas.microsoft.com/office/powerpoint/2010/main" val="1457797837"/>
       </p:ext>
     </p:extLst>
   </p:cSld>

</xml_diff>